<commit_message>
Update Use Case Model and Initial Code Commit
Updated use case model, updated use case figure to have a smaller
version, and initial commit of Meteor code.
</commit_message>
<xml_diff>
--- a/deliverables/inception/Other/UseCaseModelDiagram.pptx
+++ b/deliverables/inception/Other/UseCaseModelDiagram.pptx
@@ -6,6 +6,7 @@
   </p:sldMasterIdLst>
   <p:sldIdLst>
     <p:sldId id="256" r:id="rId2"/>
+    <p:sldId id="257" r:id="rId3"/>
   </p:sldIdLst>
   <p:sldSz cx="9144000" cy="6858000" type="screen4x3"/>
   <p:notesSz cx="6858000" cy="9144000"/>
@@ -4884,6 +4885,1836 @@
     <p:extLst>
       <p:ext uri="{BB962C8B-B14F-4D97-AF65-F5344CB8AC3E}">
         <p14:creationId xmlns:p14="http://schemas.microsoft.com/office/powerpoint/2010/main" val="704599235"/>
+      </p:ext>
+    </p:extLst>
+  </p:cSld>
+  <p:clrMapOvr>
+    <a:masterClrMapping/>
+  </p:clrMapOvr>
+</p:sld>
+</file>
+
+<file path=ppt/slides/slide2.xml><?xml version="1.0" encoding="utf-8"?>
+<p:sld xmlns:a="http://schemas.openxmlformats.org/drawingml/2006/main" xmlns:r="http://schemas.openxmlformats.org/officeDocument/2006/relationships" xmlns:p="http://schemas.openxmlformats.org/presentationml/2006/main">
+  <p:cSld>
+    <p:spTree>
+      <p:nvGrpSpPr>
+        <p:cNvPr id="1" name=""/>
+        <p:cNvGrpSpPr/>
+        <p:nvPr/>
+      </p:nvGrpSpPr>
+      <p:grpSpPr>
+        <a:xfrm>
+          <a:off x="0" y="0"/>
+          <a:ext cx="0" cy="0"/>
+          <a:chOff x="0" y="0"/>
+          <a:chExt cx="0" cy="0"/>
+        </a:xfrm>
+      </p:grpSpPr>
+      <p:grpSp>
+        <p:nvGrpSpPr>
+          <p:cNvPr id="59" name="Group 58"/>
+          <p:cNvGrpSpPr/>
+          <p:nvPr/>
+        </p:nvGrpSpPr>
+        <p:grpSpPr>
+          <a:xfrm>
+            <a:off x="513065" y="267367"/>
+            <a:ext cx="3834754" cy="3569369"/>
+            <a:chOff x="513065" y="267368"/>
+            <a:chExt cx="3804935" cy="4237790"/>
+          </a:xfrm>
+        </p:grpSpPr>
+        <p:sp>
+          <p:nvSpPr>
+            <p:cNvPr id="4" name="Rectangle 3"/>
+            <p:cNvSpPr/>
+            <p:nvPr/>
+          </p:nvSpPr>
+          <p:spPr>
+            <a:xfrm>
+              <a:off x="1790190" y="267368"/>
+              <a:ext cx="2527810" cy="4237790"/>
+            </a:xfrm>
+            <a:prstGeom prst="rect">
+              <a:avLst/>
+            </a:prstGeom>
+            <a:gradFill flip="none" rotWithShape="1">
+              <a:gsLst>
+                <a:gs pos="0">
+                  <a:schemeClr val="accent1">
+                    <a:tint val="100000"/>
+                    <a:shade val="100000"/>
+                    <a:satMod val="130000"/>
+                    <a:alpha val="0"/>
+                  </a:schemeClr>
+                </a:gs>
+                <a:gs pos="100000">
+                  <a:schemeClr val="accent1">
+                    <a:tint val="50000"/>
+                    <a:shade val="100000"/>
+                    <a:satMod val="350000"/>
+                    <a:alpha val="0"/>
+                  </a:schemeClr>
+                </a:gs>
+              </a:gsLst>
+              <a:lin ang="16200000" scaled="0"/>
+              <a:tileRect/>
+            </a:gradFill>
+          </p:spPr>
+          <p:style>
+            <a:lnRef idx="1">
+              <a:schemeClr val="accent1"/>
+            </a:lnRef>
+            <a:fillRef idx="3">
+              <a:schemeClr val="accent1"/>
+            </a:fillRef>
+            <a:effectRef idx="2">
+              <a:schemeClr val="accent1"/>
+            </a:effectRef>
+            <a:fontRef idx="minor">
+              <a:schemeClr val="lt1"/>
+            </a:fontRef>
+          </p:style>
+          <p:txBody>
+            <a:bodyPr rtlCol="0" anchor="ctr"/>
+            <a:lstStyle/>
+            <a:p>
+              <a:pPr algn="ctr"/>
+              <a:endParaRPr lang="en-US"/>
+            </a:p>
+          </p:txBody>
+        </p:sp>
+        <p:sp>
+          <p:nvSpPr>
+            <p:cNvPr id="5" name="Oval 4"/>
+            <p:cNvSpPr/>
+            <p:nvPr/>
+          </p:nvSpPr>
+          <p:spPr>
+            <a:xfrm>
+              <a:off x="2041339" y="267368"/>
+              <a:ext cx="1125283" cy="521983"/>
+            </a:xfrm>
+            <a:prstGeom prst="ellipse">
+              <a:avLst/>
+            </a:prstGeom>
+          </p:spPr>
+          <p:style>
+            <a:lnRef idx="1">
+              <a:schemeClr val="accent1"/>
+            </a:lnRef>
+            <a:fillRef idx="3">
+              <a:schemeClr val="accent1"/>
+            </a:fillRef>
+            <a:effectRef idx="2">
+              <a:schemeClr val="accent1"/>
+            </a:effectRef>
+            <a:fontRef idx="minor">
+              <a:schemeClr val="lt1"/>
+            </a:fontRef>
+          </p:style>
+          <p:txBody>
+            <a:bodyPr rtlCol="0" anchor="ctr"/>
+            <a:lstStyle/>
+            <a:p>
+              <a:pPr algn="ctr"/>
+              <a:r>
+                <a:rPr lang="en-US" sz="1200" dirty="0" smtClean="0"/>
+                <a:t>Sign-up</a:t>
+              </a:r>
+              <a:endParaRPr lang="en-US" sz="1200" dirty="0"/>
+            </a:p>
+          </p:txBody>
+        </p:sp>
+        <p:sp>
+          <p:nvSpPr>
+            <p:cNvPr id="6" name="Oval 5"/>
+            <p:cNvSpPr/>
+            <p:nvPr/>
+          </p:nvSpPr>
+          <p:spPr>
+            <a:xfrm>
+              <a:off x="3117697" y="528359"/>
+              <a:ext cx="1125283" cy="521983"/>
+            </a:xfrm>
+            <a:prstGeom prst="ellipse">
+              <a:avLst/>
+            </a:prstGeom>
+          </p:spPr>
+          <p:style>
+            <a:lnRef idx="1">
+              <a:schemeClr val="accent1"/>
+            </a:lnRef>
+            <a:fillRef idx="3">
+              <a:schemeClr val="accent1"/>
+            </a:fillRef>
+            <a:effectRef idx="2">
+              <a:schemeClr val="accent1"/>
+            </a:effectRef>
+            <a:fontRef idx="minor">
+              <a:schemeClr val="lt1"/>
+            </a:fontRef>
+          </p:style>
+          <p:txBody>
+            <a:bodyPr rtlCol="0" anchor="ctr"/>
+            <a:lstStyle/>
+            <a:p>
+              <a:pPr algn="ctr"/>
+              <a:r>
+                <a:rPr lang="en-US" sz="1200" dirty="0" smtClean="0"/>
+                <a:t>Update Data by System</a:t>
+              </a:r>
+              <a:endParaRPr lang="en-US" sz="1200" dirty="0"/>
+            </a:p>
+          </p:txBody>
+        </p:sp>
+        <p:sp>
+          <p:nvSpPr>
+            <p:cNvPr id="7" name="Oval 6"/>
+            <p:cNvSpPr/>
+            <p:nvPr/>
+          </p:nvSpPr>
+          <p:spPr>
+            <a:xfrm>
+              <a:off x="3063879" y="2521625"/>
+              <a:ext cx="1125283" cy="521983"/>
+            </a:xfrm>
+            <a:prstGeom prst="ellipse">
+              <a:avLst/>
+            </a:prstGeom>
+          </p:spPr>
+          <p:style>
+            <a:lnRef idx="1">
+              <a:schemeClr val="accent1"/>
+            </a:lnRef>
+            <a:fillRef idx="3">
+              <a:schemeClr val="accent1"/>
+            </a:fillRef>
+            <a:effectRef idx="2">
+              <a:schemeClr val="accent1"/>
+            </a:effectRef>
+            <a:fontRef idx="minor">
+              <a:schemeClr val="lt1"/>
+            </a:fontRef>
+          </p:style>
+          <p:txBody>
+            <a:bodyPr rtlCol="0" anchor="ctr"/>
+            <a:lstStyle/>
+            <a:p>
+              <a:pPr algn="ctr"/>
+              <a:r>
+                <a:rPr lang="en-US" sz="1200" dirty="0" smtClean="0"/>
+                <a:t>Unsubscribe</a:t>
+              </a:r>
+              <a:endParaRPr lang="en-US" sz="1200" dirty="0"/>
+            </a:p>
+          </p:txBody>
+        </p:sp>
+        <p:sp>
+          <p:nvSpPr>
+            <p:cNvPr id="8" name="Oval 7"/>
+            <p:cNvSpPr/>
+            <p:nvPr/>
+          </p:nvSpPr>
+          <p:spPr>
+            <a:xfrm>
+              <a:off x="1904348" y="2871087"/>
+              <a:ext cx="1125283" cy="521983"/>
+            </a:xfrm>
+            <a:prstGeom prst="ellipse">
+              <a:avLst/>
+            </a:prstGeom>
+          </p:spPr>
+          <p:style>
+            <a:lnRef idx="1">
+              <a:schemeClr val="accent1"/>
+            </a:lnRef>
+            <a:fillRef idx="3">
+              <a:schemeClr val="accent1"/>
+            </a:fillRef>
+            <a:effectRef idx="2">
+              <a:schemeClr val="accent1"/>
+            </a:effectRef>
+            <a:fontRef idx="minor">
+              <a:schemeClr val="lt1"/>
+            </a:fontRef>
+          </p:style>
+          <p:txBody>
+            <a:bodyPr rtlCol="0" anchor="ctr"/>
+            <a:lstStyle/>
+            <a:p>
+              <a:pPr algn="ctr"/>
+              <a:r>
+                <a:rPr lang="en-US" sz="1200" dirty="0" smtClean="0"/>
+                <a:t>Notification System</a:t>
+              </a:r>
+              <a:endParaRPr lang="en-US" sz="1200" dirty="0"/>
+            </a:p>
+          </p:txBody>
+        </p:sp>
+        <p:sp>
+          <p:nvSpPr>
+            <p:cNvPr id="9" name="Oval 8"/>
+            <p:cNvSpPr/>
+            <p:nvPr/>
+          </p:nvSpPr>
+          <p:spPr>
+            <a:xfrm>
+              <a:off x="1936965" y="892218"/>
+              <a:ext cx="1125283" cy="521983"/>
+            </a:xfrm>
+            <a:prstGeom prst="ellipse">
+              <a:avLst/>
+            </a:prstGeom>
+          </p:spPr>
+          <p:style>
+            <a:lnRef idx="1">
+              <a:schemeClr val="accent1"/>
+            </a:lnRef>
+            <a:fillRef idx="3">
+              <a:schemeClr val="accent1"/>
+            </a:fillRef>
+            <a:effectRef idx="2">
+              <a:schemeClr val="accent1"/>
+            </a:effectRef>
+            <a:fontRef idx="minor">
+              <a:schemeClr val="lt1"/>
+            </a:fontRef>
+          </p:style>
+          <p:txBody>
+            <a:bodyPr rtlCol="0" anchor="ctr"/>
+            <a:lstStyle/>
+            <a:p>
+              <a:pPr algn="ctr"/>
+              <a:r>
+                <a:rPr lang="en-US" sz="1200" dirty="0" smtClean="0"/>
+                <a:t>Update Data by User</a:t>
+              </a:r>
+              <a:endParaRPr lang="en-US" sz="1200" dirty="0"/>
+            </a:p>
+          </p:txBody>
+        </p:sp>
+        <p:sp>
+          <p:nvSpPr>
+            <p:cNvPr id="10" name="Oval 9"/>
+            <p:cNvSpPr/>
+            <p:nvPr/>
+          </p:nvSpPr>
+          <p:spPr>
+            <a:xfrm>
+              <a:off x="3166622" y="1227285"/>
+              <a:ext cx="1125283" cy="521983"/>
+            </a:xfrm>
+            <a:prstGeom prst="ellipse">
+              <a:avLst/>
+            </a:prstGeom>
+          </p:spPr>
+          <p:style>
+            <a:lnRef idx="1">
+              <a:schemeClr val="accent1"/>
+            </a:lnRef>
+            <a:fillRef idx="3">
+              <a:schemeClr val="accent1"/>
+            </a:fillRef>
+            <a:effectRef idx="2">
+              <a:schemeClr val="accent1"/>
+            </a:effectRef>
+            <a:fontRef idx="minor">
+              <a:schemeClr val="lt1"/>
+            </a:fontRef>
+          </p:style>
+          <p:txBody>
+            <a:bodyPr rtlCol="0" anchor="ctr"/>
+            <a:lstStyle/>
+            <a:p>
+              <a:pPr algn="ctr"/>
+              <a:r>
+                <a:rPr lang="en-US" sz="1200" dirty="0" smtClean="0"/>
+                <a:t>Analyze Road Activity</a:t>
+              </a:r>
+              <a:endParaRPr lang="en-US" sz="1200" dirty="0"/>
+            </a:p>
+          </p:txBody>
+        </p:sp>
+        <p:sp>
+          <p:nvSpPr>
+            <p:cNvPr id="11" name="Oval 10"/>
+            <p:cNvSpPr/>
+            <p:nvPr/>
+          </p:nvSpPr>
+          <p:spPr>
+            <a:xfrm>
+              <a:off x="1896194" y="1571440"/>
+              <a:ext cx="1125283" cy="521983"/>
+            </a:xfrm>
+            <a:prstGeom prst="ellipse">
+              <a:avLst/>
+            </a:prstGeom>
+          </p:spPr>
+          <p:style>
+            <a:lnRef idx="1">
+              <a:schemeClr val="accent1"/>
+            </a:lnRef>
+            <a:fillRef idx="3">
+              <a:schemeClr val="accent1"/>
+            </a:fillRef>
+            <a:effectRef idx="2">
+              <a:schemeClr val="accent1"/>
+            </a:effectRef>
+            <a:fontRef idx="minor">
+              <a:schemeClr val="lt1"/>
+            </a:fontRef>
+          </p:style>
+          <p:txBody>
+            <a:bodyPr rtlCol="0" anchor="ctr"/>
+            <a:lstStyle/>
+            <a:p>
+              <a:pPr algn="ctr"/>
+              <a:r>
+                <a:rPr lang="en-US" sz="1200" dirty="0" smtClean="0"/>
+                <a:t>Enter Roads Travelled</a:t>
+              </a:r>
+              <a:endParaRPr lang="en-US" sz="1200" dirty="0"/>
+            </a:p>
+          </p:txBody>
+        </p:sp>
+        <p:sp>
+          <p:nvSpPr>
+            <p:cNvPr id="12" name="Oval 11"/>
+            <p:cNvSpPr/>
+            <p:nvPr/>
+          </p:nvSpPr>
+          <p:spPr>
+            <a:xfrm>
+              <a:off x="3117697" y="1910286"/>
+              <a:ext cx="1125283" cy="521983"/>
+            </a:xfrm>
+            <a:prstGeom prst="ellipse">
+              <a:avLst/>
+            </a:prstGeom>
+          </p:spPr>
+          <p:style>
+            <a:lnRef idx="1">
+              <a:schemeClr val="accent1"/>
+            </a:lnRef>
+            <a:fillRef idx="3">
+              <a:schemeClr val="accent1"/>
+            </a:fillRef>
+            <a:effectRef idx="2">
+              <a:schemeClr val="accent1"/>
+            </a:effectRef>
+            <a:fontRef idx="minor">
+              <a:schemeClr val="lt1"/>
+            </a:fontRef>
+          </p:style>
+          <p:txBody>
+            <a:bodyPr rtlCol="0" anchor="ctr"/>
+            <a:lstStyle/>
+            <a:p>
+              <a:pPr algn="ctr"/>
+              <a:r>
+                <a:rPr lang="en-US" sz="1200" dirty="0" smtClean="0"/>
+                <a:t>Account Settings</a:t>
+              </a:r>
+              <a:endParaRPr lang="en-US" sz="1200" dirty="0"/>
+            </a:p>
+          </p:txBody>
+        </p:sp>
+        <p:sp>
+          <p:nvSpPr>
+            <p:cNvPr id="13" name="Oval 12"/>
+            <p:cNvSpPr/>
+            <p:nvPr/>
+          </p:nvSpPr>
+          <p:spPr>
+            <a:xfrm>
+              <a:off x="1938596" y="2217283"/>
+              <a:ext cx="1125283" cy="521983"/>
+            </a:xfrm>
+            <a:prstGeom prst="ellipse">
+              <a:avLst/>
+            </a:prstGeom>
+          </p:spPr>
+          <p:style>
+            <a:lnRef idx="1">
+              <a:schemeClr val="accent1"/>
+            </a:lnRef>
+            <a:fillRef idx="3">
+              <a:schemeClr val="accent1"/>
+            </a:fillRef>
+            <a:effectRef idx="2">
+              <a:schemeClr val="accent1"/>
+            </a:effectRef>
+            <a:fontRef idx="minor">
+              <a:schemeClr val="lt1"/>
+            </a:fontRef>
+          </p:style>
+          <p:txBody>
+            <a:bodyPr rtlCol="0" anchor="ctr"/>
+            <a:lstStyle/>
+            <a:p>
+              <a:pPr algn="ctr"/>
+              <a:r>
+                <a:rPr lang="en-US" sz="1200" dirty="0" smtClean="0"/>
+                <a:t>User Preferences</a:t>
+              </a:r>
+              <a:endParaRPr lang="en-US" sz="1200" dirty="0"/>
+            </a:p>
+          </p:txBody>
+        </p:sp>
+        <p:sp>
+          <p:nvSpPr>
+            <p:cNvPr id="14" name="Oval 13"/>
+            <p:cNvSpPr/>
+            <p:nvPr/>
+          </p:nvSpPr>
+          <p:spPr>
+            <a:xfrm>
+              <a:off x="3062248" y="3393070"/>
+              <a:ext cx="1125283" cy="521983"/>
+            </a:xfrm>
+            <a:prstGeom prst="ellipse">
+              <a:avLst/>
+            </a:prstGeom>
+          </p:spPr>
+          <p:style>
+            <a:lnRef idx="1">
+              <a:schemeClr val="accent1"/>
+            </a:lnRef>
+            <a:fillRef idx="3">
+              <a:schemeClr val="accent1"/>
+            </a:fillRef>
+            <a:effectRef idx="2">
+              <a:schemeClr val="accent1"/>
+            </a:effectRef>
+            <a:fontRef idx="minor">
+              <a:schemeClr val="lt1"/>
+            </a:fontRef>
+          </p:style>
+          <p:txBody>
+            <a:bodyPr rtlCol="0" anchor="ctr"/>
+            <a:lstStyle/>
+            <a:p>
+              <a:pPr algn="ctr"/>
+              <a:r>
+                <a:rPr lang="en-US" sz="1200" dirty="0" smtClean="0"/>
+                <a:t>Current Road Activities</a:t>
+              </a:r>
+              <a:endParaRPr lang="en-US" sz="1200" dirty="0"/>
+            </a:p>
+          </p:txBody>
+        </p:sp>
+        <p:sp>
+          <p:nvSpPr>
+            <p:cNvPr id="15" name="Oval 14"/>
+            <p:cNvSpPr/>
+            <p:nvPr/>
+          </p:nvSpPr>
+          <p:spPr>
+            <a:xfrm>
+              <a:off x="1938596" y="3654061"/>
+              <a:ext cx="1125283" cy="521983"/>
+            </a:xfrm>
+            <a:prstGeom prst="ellipse">
+              <a:avLst/>
+            </a:prstGeom>
+          </p:spPr>
+          <p:style>
+            <a:lnRef idx="1">
+              <a:schemeClr val="accent1"/>
+            </a:lnRef>
+            <a:fillRef idx="3">
+              <a:schemeClr val="accent1"/>
+            </a:fillRef>
+            <a:effectRef idx="2">
+              <a:schemeClr val="accent1"/>
+            </a:effectRef>
+            <a:fontRef idx="minor">
+              <a:schemeClr val="lt1"/>
+            </a:fontRef>
+          </p:style>
+          <p:txBody>
+            <a:bodyPr rtlCol="0" anchor="ctr"/>
+            <a:lstStyle/>
+            <a:p>
+              <a:pPr algn="ctr"/>
+              <a:r>
+                <a:rPr lang="en-US" sz="1200" dirty="0" smtClean="0"/>
+                <a:t>Sign In</a:t>
+              </a:r>
+              <a:endParaRPr lang="en-US" sz="1200" dirty="0"/>
+            </a:p>
+          </p:txBody>
+        </p:sp>
+        <p:sp>
+          <p:nvSpPr>
+            <p:cNvPr id="16" name="Oval 15"/>
+            <p:cNvSpPr/>
+            <p:nvPr/>
+          </p:nvSpPr>
+          <p:spPr>
+            <a:xfrm>
+              <a:off x="3117697" y="3983175"/>
+              <a:ext cx="1125283" cy="521983"/>
+            </a:xfrm>
+            <a:prstGeom prst="ellipse">
+              <a:avLst/>
+            </a:prstGeom>
+          </p:spPr>
+          <p:style>
+            <a:lnRef idx="1">
+              <a:schemeClr val="accent1"/>
+            </a:lnRef>
+            <a:fillRef idx="3">
+              <a:schemeClr val="accent1"/>
+            </a:fillRef>
+            <a:effectRef idx="2">
+              <a:schemeClr val="accent1"/>
+            </a:effectRef>
+            <a:fontRef idx="minor">
+              <a:schemeClr val="lt1"/>
+            </a:fontRef>
+          </p:style>
+          <p:txBody>
+            <a:bodyPr rtlCol="0" anchor="ctr"/>
+            <a:lstStyle/>
+            <a:p>
+              <a:pPr algn="ctr"/>
+              <a:r>
+                <a:rPr lang="en-US" sz="1200" dirty="0" smtClean="0"/>
+                <a:t>Sign Out</a:t>
+              </a:r>
+              <a:endParaRPr lang="en-US" sz="1200" dirty="0"/>
+            </a:p>
+          </p:txBody>
+        </p:sp>
+        <p:grpSp>
+          <p:nvGrpSpPr>
+            <p:cNvPr id="17" name="Group 16"/>
+            <p:cNvGrpSpPr/>
+            <p:nvPr/>
+          </p:nvGrpSpPr>
+          <p:grpSpPr>
+            <a:xfrm>
+              <a:off x="904988" y="1910286"/>
+              <a:ext cx="301707" cy="681232"/>
+              <a:chOff x="962523" y="935789"/>
+              <a:chExt cx="494632" cy="1029369"/>
+            </a:xfrm>
+          </p:grpSpPr>
+          <p:sp>
+            <p:nvSpPr>
+              <p:cNvPr id="18" name="Oval 17"/>
+              <p:cNvSpPr/>
+              <p:nvPr/>
+            </p:nvSpPr>
+            <p:spPr>
+              <a:xfrm>
+                <a:off x="1069474" y="935789"/>
+                <a:ext cx="294105" cy="387685"/>
+              </a:xfrm>
+              <a:prstGeom prst="ellipse">
+                <a:avLst/>
+              </a:prstGeom>
+            </p:spPr>
+            <p:style>
+              <a:lnRef idx="1">
+                <a:schemeClr val="accent1"/>
+              </a:lnRef>
+              <a:fillRef idx="3">
+                <a:schemeClr val="accent1"/>
+              </a:fillRef>
+              <a:effectRef idx="2">
+                <a:schemeClr val="accent1"/>
+              </a:effectRef>
+              <a:fontRef idx="minor">
+                <a:schemeClr val="lt1"/>
+              </a:fontRef>
+            </p:style>
+            <p:txBody>
+              <a:bodyPr rtlCol="0" anchor="ctr"/>
+              <a:lstStyle/>
+              <a:p>
+                <a:pPr algn="ctr"/>
+                <a:endParaRPr lang="en-US"/>
+              </a:p>
+            </p:txBody>
+          </p:sp>
+          <p:cxnSp>
+            <p:nvCxnSpPr>
+              <p:cNvPr id="19" name="Straight Connector 18"/>
+              <p:cNvCxnSpPr>
+                <a:stCxn id="18" idx="4"/>
+              </p:cNvCxnSpPr>
+              <p:nvPr/>
+            </p:nvCxnSpPr>
+            <p:spPr>
+              <a:xfrm>
+                <a:off x="1216527" y="1323474"/>
+                <a:ext cx="0" cy="394368"/>
+              </a:xfrm>
+              <a:prstGeom prst="line">
+                <a:avLst/>
+              </a:prstGeom>
+            </p:spPr>
+            <p:style>
+              <a:lnRef idx="2">
+                <a:schemeClr val="accent1"/>
+              </a:lnRef>
+              <a:fillRef idx="0">
+                <a:schemeClr val="accent1"/>
+              </a:fillRef>
+              <a:effectRef idx="1">
+                <a:schemeClr val="accent1"/>
+              </a:effectRef>
+              <a:fontRef idx="minor">
+                <a:schemeClr val="tx1"/>
+              </a:fontRef>
+            </p:style>
+          </p:cxnSp>
+          <p:cxnSp>
+            <p:nvCxnSpPr>
+              <p:cNvPr id="20" name="Straight Connector 19"/>
+              <p:cNvCxnSpPr/>
+              <p:nvPr/>
+            </p:nvCxnSpPr>
+            <p:spPr>
+              <a:xfrm flipH="1">
+                <a:off x="1069474" y="1717842"/>
+                <a:ext cx="147053" cy="247316"/>
+              </a:xfrm>
+              <a:prstGeom prst="line">
+                <a:avLst/>
+              </a:prstGeom>
+            </p:spPr>
+            <p:style>
+              <a:lnRef idx="2">
+                <a:schemeClr val="accent1"/>
+              </a:lnRef>
+              <a:fillRef idx="0">
+                <a:schemeClr val="accent1"/>
+              </a:fillRef>
+              <a:effectRef idx="1">
+                <a:schemeClr val="accent1"/>
+              </a:effectRef>
+              <a:fontRef idx="minor">
+                <a:schemeClr val="tx1"/>
+              </a:fontRef>
+            </p:style>
+          </p:cxnSp>
+          <p:cxnSp>
+            <p:nvCxnSpPr>
+              <p:cNvPr id="21" name="Straight Connector 20"/>
+              <p:cNvCxnSpPr/>
+              <p:nvPr/>
+            </p:nvCxnSpPr>
+            <p:spPr>
+              <a:xfrm>
+                <a:off x="1216527" y="1717842"/>
+                <a:ext cx="147052" cy="247316"/>
+              </a:xfrm>
+              <a:prstGeom prst="line">
+                <a:avLst/>
+              </a:prstGeom>
+            </p:spPr>
+            <p:style>
+              <a:lnRef idx="2">
+                <a:schemeClr val="accent1"/>
+              </a:lnRef>
+              <a:fillRef idx="0">
+                <a:schemeClr val="accent1"/>
+              </a:fillRef>
+              <a:effectRef idx="1">
+                <a:schemeClr val="accent1"/>
+              </a:effectRef>
+              <a:fontRef idx="minor">
+                <a:schemeClr val="tx1"/>
+              </a:fontRef>
+            </p:style>
+          </p:cxnSp>
+          <p:cxnSp>
+            <p:nvCxnSpPr>
+              <p:cNvPr id="22" name="Straight Connector 21"/>
+              <p:cNvCxnSpPr/>
+              <p:nvPr/>
+            </p:nvCxnSpPr>
+            <p:spPr>
+              <a:xfrm>
+                <a:off x="962523" y="1477209"/>
+                <a:ext cx="494632" cy="0"/>
+              </a:xfrm>
+              <a:prstGeom prst="line">
+                <a:avLst/>
+              </a:prstGeom>
+            </p:spPr>
+            <p:style>
+              <a:lnRef idx="2">
+                <a:schemeClr val="accent1"/>
+              </a:lnRef>
+              <a:fillRef idx="0">
+                <a:schemeClr val="accent1"/>
+              </a:fillRef>
+              <a:effectRef idx="1">
+                <a:schemeClr val="accent1"/>
+              </a:effectRef>
+              <a:fontRef idx="minor">
+                <a:schemeClr val="tx1"/>
+              </a:fontRef>
+            </p:style>
+          </p:cxnSp>
+        </p:grpSp>
+        <p:grpSp>
+          <p:nvGrpSpPr>
+            <p:cNvPr id="23" name="Group 22"/>
+            <p:cNvGrpSpPr/>
+            <p:nvPr/>
+          </p:nvGrpSpPr>
+          <p:grpSpPr>
+            <a:xfrm>
+              <a:off x="586628" y="546053"/>
+              <a:ext cx="301707" cy="681232"/>
+              <a:chOff x="962523" y="935789"/>
+              <a:chExt cx="494632" cy="1029369"/>
+            </a:xfrm>
+          </p:grpSpPr>
+          <p:sp>
+            <p:nvSpPr>
+              <p:cNvPr id="24" name="Oval 23"/>
+              <p:cNvSpPr/>
+              <p:nvPr/>
+            </p:nvSpPr>
+            <p:spPr>
+              <a:xfrm>
+                <a:off x="1069474" y="935789"/>
+                <a:ext cx="294105" cy="387685"/>
+              </a:xfrm>
+              <a:prstGeom prst="ellipse">
+                <a:avLst/>
+              </a:prstGeom>
+            </p:spPr>
+            <p:style>
+              <a:lnRef idx="1">
+                <a:schemeClr val="accent1"/>
+              </a:lnRef>
+              <a:fillRef idx="3">
+                <a:schemeClr val="accent1"/>
+              </a:fillRef>
+              <a:effectRef idx="2">
+                <a:schemeClr val="accent1"/>
+              </a:effectRef>
+              <a:fontRef idx="minor">
+                <a:schemeClr val="lt1"/>
+              </a:fontRef>
+            </p:style>
+            <p:txBody>
+              <a:bodyPr rtlCol="0" anchor="ctr"/>
+              <a:lstStyle/>
+              <a:p>
+                <a:pPr algn="ctr"/>
+                <a:endParaRPr lang="en-US"/>
+              </a:p>
+            </p:txBody>
+          </p:sp>
+          <p:cxnSp>
+            <p:nvCxnSpPr>
+              <p:cNvPr id="25" name="Straight Connector 24"/>
+              <p:cNvCxnSpPr>
+                <a:stCxn id="24" idx="4"/>
+              </p:cNvCxnSpPr>
+              <p:nvPr/>
+            </p:nvCxnSpPr>
+            <p:spPr>
+              <a:xfrm>
+                <a:off x="1216527" y="1323474"/>
+                <a:ext cx="0" cy="394368"/>
+              </a:xfrm>
+              <a:prstGeom prst="line">
+                <a:avLst/>
+              </a:prstGeom>
+            </p:spPr>
+            <p:style>
+              <a:lnRef idx="2">
+                <a:schemeClr val="accent1"/>
+              </a:lnRef>
+              <a:fillRef idx="0">
+                <a:schemeClr val="accent1"/>
+              </a:fillRef>
+              <a:effectRef idx="1">
+                <a:schemeClr val="accent1"/>
+              </a:effectRef>
+              <a:fontRef idx="minor">
+                <a:schemeClr val="tx1"/>
+              </a:fontRef>
+            </p:style>
+          </p:cxnSp>
+          <p:cxnSp>
+            <p:nvCxnSpPr>
+              <p:cNvPr id="26" name="Straight Connector 25"/>
+              <p:cNvCxnSpPr/>
+              <p:nvPr/>
+            </p:nvCxnSpPr>
+            <p:spPr>
+              <a:xfrm flipH="1">
+                <a:off x="1069474" y="1717842"/>
+                <a:ext cx="147053" cy="247316"/>
+              </a:xfrm>
+              <a:prstGeom prst="line">
+                <a:avLst/>
+              </a:prstGeom>
+            </p:spPr>
+            <p:style>
+              <a:lnRef idx="2">
+                <a:schemeClr val="accent1"/>
+              </a:lnRef>
+              <a:fillRef idx="0">
+                <a:schemeClr val="accent1"/>
+              </a:fillRef>
+              <a:effectRef idx="1">
+                <a:schemeClr val="accent1"/>
+              </a:effectRef>
+              <a:fontRef idx="minor">
+                <a:schemeClr val="tx1"/>
+              </a:fontRef>
+            </p:style>
+          </p:cxnSp>
+          <p:cxnSp>
+            <p:nvCxnSpPr>
+              <p:cNvPr id="27" name="Straight Connector 26"/>
+              <p:cNvCxnSpPr/>
+              <p:nvPr/>
+            </p:nvCxnSpPr>
+            <p:spPr>
+              <a:xfrm>
+                <a:off x="1216527" y="1717842"/>
+                <a:ext cx="147052" cy="247316"/>
+              </a:xfrm>
+              <a:prstGeom prst="line">
+                <a:avLst/>
+              </a:prstGeom>
+            </p:spPr>
+            <p:style>
+              <a:lnRef idx="2">
+                <a:schemeClr val="accent1"/>
+              </a:lnRef>
+              <a:fillRef idx="0">
+                <a:schemeClr val="accent1"/>
+              </a:fillRef>
+              <a:effectRef idx="1">
+                <a:schemeClr val="accent1"/>
+              </a:effectRef>
+              <a:fontRef idx="minor">
+                <a:schemeClr val="tx1"/>
+              </a:fontRef>
+            </p:style>
+          </p:cxnSp>
+          <p:cxnSp>
+            <p:nvCxnSpPr>
+              <p:cNvPr id="28" name="Straight Connector 27"/>
+              <p:cNvCxnSpPr/>
+              <p:nvPr/>
+            </p:nvCxnSpPr>
+            <p:spPr>
+              <a:xfrm>
+                <a:off x="962523" y="1477209"/>
+                <a:ext cx="494632" cy="0"/>
+              </a:xfrm>
+              <a:prstGeom prst="line">
+                <a:avLst/>
+              </a:prstGeom>
+            </p:spPr>
+            <p:style>
+              <a:lnRef idx="2">
+                <a:schemeClr val="accent1"/>
+              </a:lnRef>
+              <a:fillRef idx="0">
+                <a:schemeClr val="accent1"/>
+              </a:fillRef>
+              <a:effectRef idx="1">
+                <a:schemeClr val="accent1"/>
+              </a:effectRef>
+              <a:fontRef idx="minor">
+                <a:schemeClr val="tx1"/>
+              </a:fontRef>
+            </p:style>
+          </p:cxnSp>
+        </p:grpSp>
+        <p:grpSp>
+          <p:nvGrpSpPr>
+            <p:cNvPr id="29" name="Group 28"/>
+            <p:cNvGrpSpPr/>
+            <p:nvPr/>
+          </p:nvGrpSpPr>
+          <p:grpSpPr>
+            <a:xfrm>
+              <a:off x="643705" y="3485965"/>
+              <a:ext cx="301707" cy="681232"/>
+              <a:chOff x="962523" y="935789"/>
+              <a:chExt cx="494632" cy="1029369"/>
+            </a:xfrm>
+          </p:grpSpPr>
+          <p:sp>
+            <p:nvSpPr>
+              <p:cNvPr id="30" name="Oval 29"/>
+              <p:cNvSpPr/>
+              <p:nvPr/>
+            </p:nvSpPr>
+            <p:spPr>
+              <a:xfrm>
+                <a:off x="1069474" y="935789"/>
+                <a:ext cx="294105" cy="387685"/>
+              </a:xfrm>
+              <a:prstGeom prst="ellipse">
+                <a:avLst/>
+              </a:prstGeom>
+            </p:spPr>
+            <p:style>
+              <a:lnRef idx="1">
+                <a:schemeClr val="accent1"/>
+              </a:lnRef>
+              <a:fillRef idx="3">
+                <a:schemeClr val="accent1"/>
+              </a:fillRef>
+              <a:effectRef idx="2">
+                <a:schemeClr val="accent1"/>
+              </a:effectRef>
+              <a:fontRef idx="minor">
+                <a:schemeClr val="lt1"/>
+              </a:fontRef>
+            </p:style>
+            <p:txBody>
+              <a:bodyPr rtlCol="0" anchor="ctr"/>
+              <a:lstStyle/>
+              <a:p>
+                <a:pPr algn="ctr"/>
+                <a:endParaRPr lang="en-US"/>
+              </a:p>
+            </p:txBody>
+          </p:sp>
+          <p:cxnSp>
+            <p:nvCxnSpPr>
+              <p:cNvPr id="31" name="Straight Connector 30"/>
+              <p:cNvCxnSpPr>
+                <a:stCxn id="30" idx="4"/>
+              </p:cNvCxnSpPr>
+              <p:nvPr/>
+            </p:nvCxnSpPr>
+            <p:spPr>
+              <a:xfrm>
+                <a:off x="1216527" y="1323474"/>
+                <a:ext cx="0" cy="394368"/>
+              </a:xfrm>
+              <a:prstGeom prst="line">
+                <a:avLst/>
+              </a:prstGeom>
+            </p:spPr>
+            <p:style>
+              <a:lnRef idx="2">
+                <a:schemeClr val="accent1"/>
+              </a:lnRef>
+              <a:fillRef idx="0">
+                <a:schemeClr val="accent1"/>
+              </a:fillRef>
+              <a:effectRef idx="1">
+                <a:schemeClr val="accent1"/>
+              </a:effectRef>
+              <a:fontRef idx="minor">
+                <a:schemeClr val="tx1"/>
+              </a:fontRef>
+            </p:style>
+          </p:cxnSp>
+          <p:cxnSp>
+            <p:nvCxnSpPr>
+              <p:cNvPr id="32" name="Straight Connector 31"/>
+              <p:cNvCxnSpPr/>
+              <p:nvPr/>
+            </p:nvCxnSpPr>
+            <p:spPr>
+              <a:xfrm flipH="1">
+                <a:off x="1069474" y="1717842"/>
+                <a:ext cx="147053" cy="247316"/>
+              </a:xfrm>
+              <a:prstGeom prst="line">
+                <a:avLst/>
+              </a:prstGeom>
+            </p:spPr>
+            <p:style>
+              <a:lnRef idx="2">
+                <a:schemeClr val="accent1"/>
+              </a:lnRef>
+              <a:fillRef idx="0">
+                <a:schemeClr val="accent1"/>
+              </a:fillRef>
+              <a:effectRef idx="1">
+                <a:schemeClr val="accent1"/>
+              </a:effectRef>
+              <a:fontRef idx="minor">
+                <a:schemeClr val="tx1"/>
+              </a:fontRef>
+            </p:style>
+          </p:cxnSp>
+          <p:cxnSp>
+            <p:nvCxnSpPr>
+              <p:cNvPr id="33" name="Straight Connector 32"/>
+              <p:cNvCxnSpPr/>
+              <p:nvPr/>
+            </p:nvCxnSpPr>
+            <p:spPr>
+              <a:xfrm>
+                <a:off x="1216527" y="1717842"/>
+                <a:ext cx="147052" cy="247316"/>
+              </a:xfrm>
+              <a:prstGeom prst="line">
+                <a:avLst/>
+              </a:prstGeom>
+            </p:spPr>
+            <p:style>
+              <a:lnRef idx="2">
+                <a:schemeClr val="accent1"/>
+              </a:lnRef>
+              <a:fillRef idx="0">
+                <a:schemeClr val="accent1"/>
+              </a:fillRef>
+              <a:effectRef idx="1">
+                <a:schemeClr val="accent1"/>
+              </a:effectRef>
+              <a:fontRef idx="minor">
+                <a:schemeClr val="tx1"/>
+              </a:fontRef>
+            </p:style>
+          </p:cxnSp>
+          <p:cxnSp>
+            <p:nvCxnSpPr>
+              <p:cNvPr id="34" name="Straight Connector 33"/>
+              <p:cNvCxnSpPr/>
+              <p:nvPr/>
+            </p:nvCxnSpPr>
+            <p:spPr>
+              <a:xfrm>
+                <a:off x="962523" y="1477209"/>
+                <a:ext cx="494632" cy="0"/>
+              </a:xfrm>
+              <a:prstGeom prst="line">
+                <a:avLst/>
+              </a:prstGeom>
+            </p:spPr>
+            <p:style>
+              <a:lnRef idx="2">
+                <a:schemeClr val="accent1"/>
+              </a:lnRef>
+              <a:fillRef idx="0">
+                <a:schemeClr val="accent1"/>
+              </a:fillRef>
+              <a:effectRef idx="1">
+                <a:schemeClr val="accent1"/>
+              </a:effectRef>
+              <a:fontRef idx="minor">
+                <a:schemeClr val="tx1"/>
+              </a:fontRef>
+            </p:style>
+          </p:cxnSp>
+        </p:grpSp>
+        <p:sp>
+          <p:nvSpPr>
+            <p:cNvPr id="35" name="TextBox 34"/>
+            <p:cNvSpPr txBox="1"/>
+            <p:nvPr/>
+          </p:nvSpPr>
+          <p:spPr>
+            <a:xfrm>
+              <a:off x="513065" y="1227285"/>
+              <a:ext cx="456814" cy="244422"/>
+            </a:xfrm>
+            <a:prstGeom prst="rect">
+              <a:avLst/>
+            </a:prstGeom>
+            <a:noFill/>
+          </p:spPr>
+          <p:txBody>
+            <a:bodyPr wrap="none" rtlCol="0">
+              <a:spAutoFit/>
+            </a:bodyPr>
+            <a:lstStyle/>
+            <a:p>
+              <a:r>
+                <a:rPr lang="en-US" dirty="0" smtClean="0">
+                  <a:solidFill>
+                    <a:schemeClr val="tx2">
+                      <a:lumMod val="60000"/>
+                      <a:lumOff val="40000"/>
+                    </a:schemeClr>
+                  </a:solidFill>
+                </a:rPr>
+                <a:t>ODOT</a:t>
+              </a:r>
+              <a:endParaRPr lang="en-US" dirty="0">
+                <a:solidFill>
+                  <a:schemeClr val="tx2">
+                    <a:lumMod val="60000"/>
+                    <a:lumOff val="40000"/>
+                  </a:schemeClr>
+                </a:solidFill>
+              </a:endParaRPr>
+            </a:p>
+          </p:txBody>
+        </p:sp>
+        <p:sp>
+          <p:nvSpPr>
+            <p:cNvPr id="36" name="TextBox 35"/>
+            <p:cNvSpPr txBox="1"/>
+            <p:nvPr/>
+          </p:nvSpPr>
+          <p:spPr>
+            <a:xfrm>
+              <a:off x="750312" y="2558940"/>
+              <a:ext cx="378593" cy="244422"/>
+            </a:xfrm>
+            <a:prstGeom prst="rect">
+              <a:avLst/>
+            </a:prstGeom>
+            <a:noFill/>
+          </p:spPr>
+          <p:txBody>
+            <a:bodyPr wrap="none" rtlCol="0">
+              <a:spAutoFit/>
+            </a:bodyPr>
+            <a:lstStyle/>
+            <a:p>
+              <a:r>
+                <a:rPr lang="en-US" dirty="0" smtClean="0">
+                  <a:solidFill>
+                    <a:schemeClr val="tx2">
+                      <a:lumMod val="60000"/>
+                      <a:lumOff val="40000"/>
+                    </a:schemeClr>
+                  </a:solidFill>
+                </a:rPr>
+                <a:t>User</a:t>
+              </a:r>
+              <a:endParaRPr lang="en-US" dirty="0">
+                <a:solidFill>
+                  <a:schemeClr val="tx2">
+                    <a:lumMod val="60000"/>
+                    <a:lumOff val="40000"/>
+                  </a:schemeClr>
+                </a:solidFill>
+              </a:endParaRPr>
+            </a:p>
+          </p:txBody>
+        </p:sp>
+        <p:sp>
+          <p:nvSpPr>
+            <p:cNvPr id="37" name="TextBox 36"/>
+            <p:cNvSpPr txBox="1"/>
+            <p:nvPr/>
+          </p:nvSpPr>
+          <p:spPr>
+            <a:xfrm>
+              <a:off x="561989" y="4176044"/>
+              <a:ext cx="525824" cy="244422"/>
+            </a:xfrm>
+            <a:prstGeom prst="rect">
+              <a:avLst/>
+            </a:prstGeom>
+            <a:noFill/>
+          </p:spPr>
+          <p:txBody>
+            <a:bodyPr wrap="none" rtlCol="0">
+              <a:spAutoFit/>
+            </a:bodyPr>
+            <a:lstStyle/>
+            <a:p>
+              <a:r>
+                <a:rPr lang="en-US" dirty="0" smtClean="0">
+                  <a:solidFill>
+                    <a:schemeClr val="tx2">
+                      <a:lumMod val="60000"/>
+                      <a:lumOff val="40000"/>
+                    </a:schemeClr>
+                  </a:solidFill>
+                </a:rPr>
+                <a:t>System</a:t>
+              </a:r>
+              <a:endParaRPr lang="en-US" dirty="0">
+                <a:solidFill>
+                  <a:schemeClr val="tx2">
+                    <a:lumMod val="60000"/>
+                    <a:lumOff val="40000"/>
+                  </a:schemeClr>
+                </a:solidFill>
+              </a:endParaRPr>
+            </a:p>
+          </p:txBody>
+        </p:sp>
+        <p:cxnSp>
+          <p:nvCxnSpPr>
+            <p:cNvPr id="38" name="Straight Connector 37"/>
+            <p:cNvCxnSpPr>
+              <a:stCxn id="5" idx="2"/>
+            </p:cNvCxnSpPr>
+            <p:nvPr/>
+          </p:nvCxnSpPr>
+          <p:spPr>
+            <a:xfrm flipH="1">
+              <a:off x="1302689" y="528360"/>
+              <a:ext cx="738650" cy="1740235"/>
+            </a:xfrm>
+            <a:prstGeom prst="line">
+              <a:avLst/>
+            </a:prstGeom>
+          </p:spPr>
+          <p:style>
+            <a:lnRef idx="2">
+              <a:schemeClr val="accent1"/>
+            </a:lnRef>
+            <a:fillRef idx="0">
+              <a:schemeClr val="accent1"/>
+            </a:fillRef>
+            <a:effectRef idx="1">
+              <a:schemeClr val="accent1"/>
+            </a:effectRef>
+            <a:fontRef idx="minor">
+              <a:schemeClr val="tx1"/>
+            </a:fontRef>
+          </p:style>
+        </p:cxnSp>
+        <p:cxnSp>
+          <p:nvCxnSpPr>
+            <p:cNvPr id="39" name="Straight Connector 38"/>
+            <p:cNvCxnSpPr>
+              <a:stCxn id="9" idx="2"/>
+            </p:cNvCxnSpPr>
+            <p:nvPr/>
+          </p:nvCxnSpPr>
+          <p:spPr>
+            <a:xfrm flipH="1">
+              <a:off x="1302689" y="1153210"/>
+              <a:ext cx="634276" cy="1115385"/>
+            </a:xfrm>
+            <a:prstGeom prst="line">
+              <a:avLst/>
+            </a:prstGeom>
+          </p:spPr>
+          <p:style>
+            <a:lnRef idx="2">
+              <a:schemeClr val="accent1"/>
+            </a:lnRef>
+            <a:fillRef idx="0">
+              <a:schemeClr val="accent1"/>
+            </a:fillRef>
+            <a:effectRef idx="1">
+              <a:schemeClr val="accent1"/>
+            </a:effectRef>
+            <a:fontRef idx="minor">
+              <a:schemeClr val="tx1"/>
+            </a:fontRef>
+          </p:style>
+        </p:cxnSp>
+        <p:cxnSp>
+          <p:nvCxnSpPr>
+            <p:cNvPr id="40" name="Straight Connector 39"/>
+            <p:cNvCxnSpPr>
+              <a:stCxn id="11" idx="2"/>
+            </p:cNvCxnSpPr>
+            <p:nvPr/>
+          </p:nvCxnSpPr>
+          <p:spPr>
+            <a:xfrm flipH="1">
+              <a:off x="1302689" y="1832432"/>
+              <a:ext cx="593506" cy="436164"/>
+            </a:xfrm>
+            <a:prstGeom prst="line">
+              <a:avLst/>
+            </a:prstGeom>
+          </p:spPr>
+          <p:style>
+            <a:lnRef idx="2">
+              <a:schemeClr val="accent1"/>
+            </a:lnRef>
+            <a:fillRef idx="0">
+              <a:schemeClr val="accent1"/>
+            </a:fillRef>
+            <a:effectRef idx="1">
+              <a:schemeClr val="accent1"/>
+            </a:effectRef>
+            <a:fontRef idx="minor">
+              <a:schemeClr val="tx1"/>
+            </a:fontRef>
+          </p:style>
+        </p:cxnSp>
+        <p:cxnSp>
+          <p:nvCxnSpPr>
+            <p:cNvPr id="41" name="Straight Connector 40"/>
+            <p:cNvCxnSpPr>
+              <a:stCxn id="13" idx="2"/>
+            </p:cNvCxnSpPr>
+            <p:nvPr/>
+          </p:nvCxnSpPr>
+          <p:spPr>
+            <a:xfrm flipH="1" flipV="1">
+              <a:off x="1302689" y="2268595"/>
+              <a:ext cx="635907" cy="209679"/>
+            </a:xfrm>
+            <a:prstGeom prst="line">
+              <a:avLst/>
+            </a:prstGeom>
+          </p:spPr>
+          <p:style>
+            <a:lnRef idx="2">
+              <a:schemeClr val="accent1"/>
+            </a:lnRef>
+            <a:fillRef idx="0">
+              <a:schemeClr val="accent1"/>
+            </a:fillRef>
+            <a:effectRef idx="1">
+              <a:schemeClr val="accent1"/>
+            </a:effectRef>
+            <a:fontRef idx="minor">
+              <a:schemeClr val="tx1"/>
+            </a:fontRef>
+          </p:style>
+        </p:cxnSp>
+        <p:cxnSp>
+          <p:nvCxnSpPr>
+            <p:cNvPr id="42" name="Straight Connector 41"/>
+            <p:cNvCxnSpPr>
+              <a:stCxn id="8" idx="2"/>
+            </p:cNvCxnSpPr>
+            <p:nvPr/>
+          </p:nvCxnSpPr>
+          <p:spPr>
+            <a:xfrm flipH="1">
+              <a:off x="1023696" y="3132079"/>
+              <a:ext cx="880652" cy="712196"/>
+            </a:xfrm>
+            <a:prstGeom prst="line">
+              <a:avLst/>
+            </a:prstGeom>
+          </p:spPr>
+          <p:style>
+            <a:lnRef idx="2">
+              <a:schemeClr val="accent1"/>
+            </a:lnRef>
+            <a:fillRef idx="0">
+              <a:schemeClr val="accent1"/>
+            </a:fillRef>
+            <a:effectRef idx="1">
+              <a:schemeClr val="accent1"/>
+            </a:effectRef>
+            <a:fontRef idx="minor">
+              <a:schemeClr val="tx1"/>
+            </a:fontRef>
+          </p:style>
+        </p:cxnSp>
+        <p:cxnSp>
+          <p:nvCxnSpPr>
+            <p:cNvPr id="43" name="Straight Connector 42"/>
+            <p:cNvCxnSpPr>
+              <a:stCxn id="10" idx="2"/>
+            </p:cNvCxnSpPr>
+            <p:nvPr/>
+          </p:nvCxnSpPr>
+          <p:spPr>
+            <a:xfrm flipH="1">
+              <a:off x="1896194" y="1488277"/>
+              <a:ext cx="1270428" cy="83163"/>
+            </a:xfrm>
+            <a:prstGeom prst="line">
+              <a:avLst/>
+            </a:prstGeom>
+          </p:spPr>
+          <p:style>
+            <a:lnRef idx="2">
+              <a:schemeClr val="accent1"/>
+            </a:lnRef>
+            <a:fillRef idx="0">
+              <a:schemeClr val="accent1"/>
+            </a:fillRef>
+            <a:effectRef idx="1">
+              <a:schemeClr val="accent1"/>
+            </a:effectRef>
+            <a:fontRef idx="minor">
+              <a:schemeClr val="tx1"/>
+            </a:fontRef>
+          </p:style>
+        </p:cxnSp>
+        <p:cxnSp>
+          <p:nvCxnSpPr>
+            <p:cNvPr id="44" name="Straight Connector 43"/>
+            <p:cNvCxnSpPr/>
+            <p:nvPr/>
+          </p:nvCxnSpPr>
+          <p:spPr>
+            <a:xfrm flipH="1">
+              <a:off x="1302689" y="1571440"/>
+              <a:ext cx="601660" cy="697155"/>
+            </a:xfrm>
+            <a:prstGeom prst="line">
+              <a:avLst/>
+            </a:prstGeom>
+          </p:spPr>
+          <p:style>
+            <a:lnRef idx="2">
+              <a:schemeClr val="accent1"/>
+            </a:lnRef>
+            <a:fillRef idx="0">
+              <a:schemeClr val="accent1"/>
+            </a:fillRef>
+            <a:effectRef idx="1">
+              <a:schemeClr val="accent1"/>
+            </a:effectRef>
+            <a:fontRef idx="minor">
+              <a:schemeClr val="tx1"/>
+            </a:fontRef>
+          </p:style>
+        </p:cxnSp>
+        <p:cxnSp>
+          <p:nvCxnSpPr>
+            <p:cNvPr id="45" name="Straight Connector 44"/>
+            <p:cNvCxnSpPr>
+              <a:stCxn id="12" idx="2"/>
+            </p:cNvCxnSpPr>
+            <p:nvPr/>
+          </p:nvCxnSpPr>
+          <p:spPr>
+            <a:xfrm flipH="1">
+              <a:off x="1302689" y="2171277"/>
+              <a:ext cx="1815008" cy="43352"/>
+            </a:xfrm>
+            <a:prstGeom prst="line">
+              <a:avLst/>
+            </a:prstGeom>
+          </p:spPr>
+          <p:style>
+            <a:lnRef idx="2">
+              <a:schemeClr val="accent1"/>
+            </a:lnRef>
+            <a:fillRef idx="0">
+              <a:schemeClr val="accent1"/>
+            </a:fillRef>
+            <a:effectRef idx="1">
+              <a:schemeClr val="accent1"/>
+            </a:effectRef>
+            <a:fontRef idx="minor">
+              <a:schemeClr val="tx1"/>
+            </a:fontRef>
+          </p:style>
+        </p:cxnSp>
+        <p:cxnSp>
+          <p:nvCxnSpPr>
+            <p:cNvPr id="46" name="Straight Connector 45"/>
+            <p:cNvCxnSpPr>
+              <a:stCxn id="7" idx="2"/>
+            </p:cNvCxnSpPr>
+            <p:nvPr/>
+          </p:nvCxnSpPr>
+          <p:spPr>
+            <a:xfrm flipH="1" flipV="1">
+              <a:off x="1896194" y="2739265"/>
+              <a:ext cx="1167685" cy="43352"/>
+            </a:xfrm>
+            <a:prstGeom prst="line">
+              <a:avLst/>
+            </a:prstGeom>
+          </p:spPr>
+          <p:style>
+            <a:lnRef idx="2">
+              <a:schemeClr val="accent1"/>
+            </a:lnRef>
+            <a:fillRef idx="0">
+              <a:schemeClr val="accent1"/>
+            </a:fillRef>
+            <a:effectRef idx="1">
+              <a:schemeClr val="accent1"/>
+            </a:effectRef>
+            <a:fontRef idx="minor">
+              <a:schemeClr val="tx1"/>
+            </a:fontRef>
+          </p:style>
+        </p:cxnSp>
+        <p:cxnSp>
+          <p:nvCxnSpPr>
+            <p:cNvPr id="47" name="Straight Connector 46"/>
+            <p:cNvCxnSpPr/>
+            <p:nvPr/>
+          </p:nvCxnSpPr>
+          <p:spPr>
+            <a:xfrm flipH="1" flipV="1">
+              <a:off x="1302689" y="2268595"/>
+              <a:ext cx="601660" cy="470670"/>
+            </a:xfrm>
+            <a:prstGeom prst="line">
+              <a:avLst/>
+            </a:prstGeom>
+          </p:spPr>
+          <p:style>
+            <a:lnRef idx="2">
+              <a:schemeClr val="accent1"/>
+            </a:lnRef>
+            <a:fillRef idx="0">
+              <a:schemeClr val="accent1"/>
+            </a:fillRef>
+            <a:effectRef idx="1">
+              <a:schemeClr val="accent1"/>
+            </a:effectRef>
+            <a:fontRef idx="minor">
+              <a:schemeClr val="tx1"/>
+            </a:fontRef>
+          </p:style>
+        </p:cxnSp>
+        <p:cxnSp>
+          <p:nvCxnSpPr>
+            <p:cNvPr id="48" name="Straight Connector 47"/>
+            <p:cNvCxnSpPr>
+              <a:endCxn id="9" idx="2"/>
+            </p:cNvCxnSpPr>
+            <p:nvPr/>
+          </p:nvCxnSpPr>
+          <p:spPr>
+            <a:xfrm>
+              <a:off x="924096" y="892218"/>
+              <a:ext cx="1012869" cy="260992"/>
+            </a:xfrm>
+            <a:prstGeom prst="line">
+              <a:avLst/>
+            </a:prstGeom>
+          </p:spPr>
+          <p:style>
+            <a:lnRef idx="2">
+              <a:schemeClr val="accent1"/>
+            </a:lnRef>
+            <a:fillRef idx="0">
+              <a:schemeClr val="accent1"/>
+            </a:fillRef>
+            <a:effectRef idx="1">
+              <a:schemeClr val="accent1"/>
+            </a:effectRef>
+            <a:fontRef idx="minor">
+              <a:schemeClr val="tx1"/>
+            </a:fontRef>
+          </p:style>
+        </p:cxnSp>
+        <p:cxnSp>
+          <p:nvCxnSpPr>
+            <p:cNvPr id="49" name="Straight Connector 48"/>
+            <p:cNvCxnSpPr/>
+            <p:nvPr/>
+          </p:nvCxnSpPr>
+          <p:spPr>
+            <a:xfrm flipH="1">
+              <a:off x="924096" y="789351"/>
+              <a:ext cx="2193601" cy="102868"/>
+            </a:xfrm>
+            <a:prstGeom prst="line">
+              <a:avLst/>
+            </a:prstGeom>
+          </p:spPr>
+          <p:style>
+            <a:lnRef idx="2">
+              <a:schemeClr val="accent1"/>
+            </a:lnRef>
+            <a:fillRef idx="0">
+              <a:schemeClr val="accent1"/>
+            </a:fillRef>
+            <a:effectRef idx="1">
+              <a:schemeClr val="accent1"/>
+            </a:effectRef>
+            <a:fontRef idx="minor">
+              <a:schemeClr val="tx1"/>
+            </a:fontRef>
+          </p:style>
+        </p:cxnSp>
+        <p:cxnSp>
+          <p:nvCxnSpPr>
+            <p:cNvPr id="50" name="Straight Connector 49"/>
+            <p:cNvCxnSpPr>
+              <a:stCxn id="14" idx="2"/>
+            </p:cNvCxnSpPr>
+            <p:nvPr/>
+          </p:nvCxnSpPr>
+          <p:spPr>
+            <a:xfrm flipH="1" flipV="1">
+              <a:off x="1488484" y="3301944"/>
+              <a:ext cx="1573764" cy="352117"/>
+            </a:xfrm>
+            <a:prstGeom prst="line">
+              <a:avLst/>
+            </a:prstGeom>
+          </p:spPr>
+          <p:style>
+            <a:lnRef idx="2">
+              <a:schemeClr val="accent1"/>
+            </a:lnRef>
+            <a:fillRef idx="0">
+              <a:schemeClr val="accent1"/>
+            </a:fillRef>
+            <a:effectRef idx="1">
+              <a:schemeClr val="accent1"/>
+            </a:effectRef>
+            <a:fontRef idx="minor">
+              <a:schemeClr val="tx1"/>
+            </a:fontRef>
+          </p:style>
+        </p:cxnSp>
+        <p:cxnSp>
+          <p:nvCxnSpPr>
+            <p:cNvPr id="51" name="Straight Connector 50"/>
+            <p:cNvCxnSpPr/>
+            <p:nvPr/>
+          </p:nvCxnSpPr>
+          <p:spPr>
+            <a:xfrm flipH="1" flipV="1">
+              <a:off x="1302689" y="2268596"/>
+              <a:ext cx="185794" cy="1033349"/>
+            </a:xfrm>
+            <a:prstGeom prst="line">
+              <a:avLst/>
+            </a:prstGeom>
+          </p:spPr>
+          <p:style>
+            <a:lnRef idx="2">
+              <a:schemeClr val="accent1"/>
+            </a:lnRef>
+            <a:fillRef idx="0">
+              <a:schemeClr val="accent1"/>
+            </a:fillRef>
+            <a:effectRef idx="1">
+              <a:schemeClr val="accent1"/>
+            </a:effectRef>
+            <a:fontRef idx="minor">
+              <a:schemeClr val="tx1"/>
+            </a:fontRef>
+          </p:style>
+        </p:cxnSp>
+        <p:cxnSp>
+          <p:nvCxnSpPr>
+            <p:cNvPr id="52" name="Straight Connector 51"/>
+            <p:cNvCxnSpPr>
+              <a:stCxn id="15" idx="2"/>
+            </p:cNvCxnSpPr>
+            <p:nvPr/>
+          </p:nvCxnSpPr>
+          <p:spPr>
+            <a:xfrm flipH="1" flipV="1">
+              <a:off x="1382478" y="3393070"/>
+              <a:ext cx="556117" cy="521983"/>
+            </a:xfrm>
+            <a:prstGeom prst="line">
+              <a:avLst/>
+            </a:prstGeom>
+          </p:spPr>
+          <p:style>
+            <a:lnRef idx="2">
+              <a:schemeClr val="accent1"/>
+            </a:lnRef>
+            <a:fillRef idx="0">
+              <a:schemeClr val="accent1"/>
+            </a:fillRef>
+            <a:effectRef idx="1">
+              <a:schemeClr val="accent1"/>
+            </a:effectRef>
+            <a:fontRef idx="minor">
+              <a:schemeClr val="tx1"/>
+            </a:fontRef>
+          </p:style>
+        </p:cxnSp>
+        <p:cxnSp>
+          <p:nvCxnSpPr>
+            <p:cNvPr id="53" name="Straight Connector 52"/>
+            <p:cNvCxnSpPr/>
+            <p:nvPr/>
+          </p:nvCxnSpPr>
+          <p:spPr>
+            <a:xfrm flipH="1" flipV="1">
+              <a:off x="1302689" y="2268595"/>
+              <a:ext cx="79790" cy="1124475"/>
+            </a:xfrm>
+            <a:prstGeom prst="line">
+              <a:avLst/>
+            </a:prstGeom>
+          </p:spPr>
+          <p:style>
+            <a:lnRef idx="2">
+              <a:schemeClr val="accent1"/>
+            </a:lnRef>
+            <a:fillRef idx="0">
+              <a:schemeClr val="accent1"/>
+            </a:fillRef>
+            <a:effectRef idx="1">
+              <a:schemeClr val="accent1"/>
+            </a:effectRef>
+            <a:fontRef idx="minor">
+              <a:schemeClr val="tx1"/>
+            </a:fontRef>
+          </p:style>
+        </p:cxnSp>
+        <p:cxnSp>
+          <p:nvCxnSpPr>
+            <p:cNvPr id="54" name="Straight Connector 53"/>
+            <p:cNvCxnSpPr>
+              <a:stCxn id="16" idx="2"/>
+            </p:cNvCxnSpPr>
+            <p:nvPr/>
+          </p:nvCxnSpPr>
+          <p:spPr>
+            <a:xfrm flipH="1" flipV="1">
+              <a:off x="1302689" y="4003524"/>
+              <a:ext cx="1815008" cy="240643"/>
+            </a:xfrm>
+            <a:prstGeom prst="line">
+              <a:avLst/>
+            </a:prstGeom>
+          </p:spPr>
+          <p:style>
+            <a:lnRef idx="2">
+              <a:schemeClr val="accent1"/>
+            </a:lnRef>
+            <a:fillRef idx="0">
+              <a:schemeClr val="accent1"/>
+            </a:fillRef>
+            <a:effectRef idx="1">
+              <a:schemeClr val="accent1"/>
+            </a:effectRef>
+            <a:fontRef idx="minor">
+              <a:schemeClr val="tx1"/>
+            </a:fontRef>
+          </p:style>
+        </p:cxnSp>
+        <p:cxnSp>
+          <p:nvCxnSpPr>
+            <p:cNvPr id="55" name="Straight Connector 54"/>
+            <p:cNvCxnSpPr/>
+            <p:nvPr/>
+          </p:nvCxnSpPr>
+          <p:spPr>
+            <a:xfrm flipV="1">
+              <a:off x="1302689" y="2268595"/>
+              <a:ext cx="0" cy="1734929"/>
+            </a:xfrm>
+            <a:prstGeom prst="line">
+              <a:avLst/>
+            </a:prstGeom>
+          </p:spPr>
+          <p:style>
+            <a:lnRef idx="2">
+              <a:schemeClr val="accent1"/>
+            </a:lnRef>
+            <a:fillRef idx="0">
+              <a:schemeClr val="accent1"/>
+            </a:fillRef>
+            <a:effectRef idx="1">
+              <a:schemeClr val="accent1"/>
+            </a:effectRef>
+            <a:fontRef idx="minor">
+              <a:schemeClr val="tx1"/>
+            </a:fontRef>
+          </p:style>
+        </p:cxnSp>
+      </p:grpSp>
+    </p:spTree>
+    <p:extLst>
+      <p:ext uri="{BB962C8B-B14F-4D97-AF65-F5344CB8AC3E}">
+        <p14:creationId xmlns:p14="http://schemas.microsoft.com/office/powerpoint/2010/main" val="90243005"/>
       </p:ext>
     </p:extLst>
   </p:cSld>

</xml_diff>

<commit_message>
Updates to Use Case Model and Vision Statement
Updates per Dr. Walden’s feedback
</commit_message>
<xml_diff>
--- a/deliverables/inception/Other/UseCaseModelDiagram.pptx
+++ b/deliverables/inception/Other/UseCaseModelDiagram.pptx
@@ -289,7 +289,7 @@
           <a:p>
             <a:fld id="{1B5FB914-897B-A249-A5EE-597EB3BAE429}" type="datetimeFigureOut">
               <a:rPr lang="en-US" smtClean="0"/>
-              <a:t>9/7/14</a:t>
+              <a:t>9/8/14</a:t>
             </a:fld>
             <a:endParaRPr lang="en-US"/>
           </a:p>
@@ -459,7 +459,7 @@
           <a:p>
             <a:fld id="{1B5FB914-897B-A249-A5EE-597EB3BAE429}" type="datetimeFigureOut">
               <a:rPr lang="en-US" smtClean="0"/>
-              <a:t>9/7/14</a:t>
+              <a:t>9/8/14</a:t>
             </a:fld>
             <a:endParaRPr lang="en-US"/>
           </a:p>
@@ -639,7 +639,7 @@
           <a:p>
             <a:fld id="{1B5FB914-897B-A249-A5EE-597EB3BAE429}" type="datetimeFigureOut">
               <a:rPr lang="en-US" smtClean="0"/>
-              <a:t>9/7/14</a:t>
+              <a:t>9/8/14</a:t>
             </a:fld>
             <a:endParaRPr lang="en-US"/>
           </a:p>
@@ -809,7 +809,7 @@
           <a:p>
             <a:fld id="{1B5FB914-897B-A249-A5EE-597EB3BAE429}" type="datetimeFigureOut">
               <a:rPr lang="en-US" smtClean="0"/>
-              <a:t>9/7/14</a:t>
+              <a:t>9/8/14</a:t>
             </a:fld>
             <a:endParaRPr lang="en-US"/>
           </a:p>
@@ -1055,7 +1055,7 @@
           <a:p>
             <a:fld id="{1B5FB914-897B-A249-A5EE-597EB3BAE429}" type="datetimeFigureOut">
               <a:rPr lang="en-US" smtClean="0"/>
-              <a:t>9/7/14</a:t>
+              <a:t>9/8/14</a:t>
             </a:fld>
             <a:endParaRPr lang="en-US"/>
           </a:p>
@@ -1343,7 +1343,7 @@
           <a:p>
             <a:fld id="{1B5FB914-897B-A249-A5EE-597EB3BAE429}" type="datetimeFigureOut">
               <a:rPr lang="en-US" smtClean="0"/>
-              <a:t>9/7/14</a:t>
+              <a:t>9/8/14</a:t>
             </a:fld>
             <a:endParaRPr lang="en-US"/>
           </a:p>
@@ -1765,7 +1765,7 @@
           <a:p>
             <a:fld id="{1B5FB914-897B-A249-A5EE-597EB3BAE429}" type="datetimeFigureOut">
               <a:rPr lang="en-US" smtClean="0"/>
-              <a:t>9/7/14</a:t>
+              <a:t>9/8/14</a:t>
             </a:fld>
             <a:endParaRPr lang="en-US"/>
           </a:p>
@@ -1883,7 +1883,7 @@
           <a:p>
             <a:fld id="{1B5FB914-897B-A249-A5EE-597EB3BAE429}" type="datetimeFigureOut">
               <a:rPr lang="en-US" smtClean="0"/>
-              <a:t>9/7/14</a:t>
+              <a:t>9/8/14</a:t>
             </a:fld>
             <a:endParaRPr lang="en-US"/>
           </a:p>
@@ -1978,7 +1978,7 @@
           <a:p>
             <a:fld id="{1B5FB914-897B-A249-A5EE-597EB3BAE429}" type="datetimeFigureOut">
               <a:rPr lang="en-US" smtClean="0"/>
-              <a:t>9/7/14</a:t>
+              <a:t>9/8/14</a:t>
             </a:fld>
             <a:endParaRPr lang="en-US"/>
           </a:p>
@@ -2255,7 +2255,7 @@
           <a:p>
             <a:fld id="{1B5FB914-897B-A249-A5EE-597EB3BAE429}" type="datetimeFigureOut">
               <a:rPr lang="en-US" smtClean="0"/>
-              <a:t>9/7/14</a:t>
+              <a:t>9/8/14</a:t>
             </a:fld>
             <a:endParaRPr lang="en-US"/>
           </a:p>
@@ -2508,7 +2508,7 @@
           <a:p>
             <a:fld id="{1B5FB914-897B-A249-A5EE-597EB3BAE429}" type="datetimeFigureOut">
               <a:rPr lang="en-US" smtClean="0"/>
-              <a:t>9/7/14</a:t>
+              <a:t>9/8/14</a:t>
             </a:fld>
             <a:endParaRPr lang="en-US"/>
           </a:p>
@@ -2721,7 +2721,7 @@
           <a:p>
             <a:fld id="{1B5FB914-897B-A249-A5EE-597EB3BAE429}" type="datetimeFigureOut">
               <a:rPr lang="en-US" smtClean="0"/>
-              <a:t>9/7/14</a:t>
+              <a:t>9/8/14</a:t>
             </a:fld>
             <a:endParaRPr lang="en-US"/>
           </a:p>
@@ -3104,8 +3104,8 @@
         </p:nvSpPr>
         <p:spPr>
           <a:xfrm>
-            <a:off x="2606842" y="267368"/>
-            <a:ext cx="4144211" cy="6403474"/>
+            <a:off x="1569708" y="267368"/>
+            <a:ext cx="5975684" cy="6403474"/>
           </a:xfrm>
           <a:prstGeom prst="rect">
             <a:avLst/>
@@ -3164,7 +3164,7 @@
         </p:nvSpPr>
         <p:spPr>
           <a:xfrm>
-            <a:off x="3018588" y="267368"/>
+            <a:off x="1981454" y="267368"/>
             <a:ext cx="1844842" cy="788737"/>
           </a:xfrm>
           <a:prstGeom prst="ellipse">
@@ -3206,7 +3206,7 @@
         </p:nvSpPr>
         <p:spPr>
           <a:xfrm>
-            <a:off x="4783220" y="661736"/>
+            <a:off x="3746086" y="661736"/>
             <a:ext cx="1844842" cy="788737"/>
           </a:xfrm>
           <a:prstGeom prst="ellipse">
@@ -3248,7 +3248,7 @@
         </p:nvSpPr>
         <p:spPr>
           <a:xfrm>
-            <a:off x="4694988" y="3673643"/>
+            <a:off x="3657854" y="3673643"/>
             <a:ext cx="1844842" cy="788737"/>
           </a:xfrm>
           <a:prstGeom prst="ellipse">
@@ -3276,7 +3276,7 @@
             <a:pPr algn="ctr"/>
             <a:r>
               <a:rPr lang="en-US" dirty="0" smtClean="0"/>
-              <a:t>Unsubscribe</a:t>
+              <a:t>Remove Account</a:t>
             </a:r>
             <a:endParaRPr lang="en-US" dirty="0"/>
           </a:p>
@@ -3290,7 +3290,7 @@
         </p:nvSpPr>
         <p:spPr>
           <a:xfrm>
-            <a:off x="2793998" y="4201694"/>
+            <a:off x="1756864" y="4201694"/>
             <a:ext cx="1844842" cy="788737"/>
           </a:xfrm>
           <a:prstGeom prst="ellipse">
@@ -3332,7 +3332,7 @@
         </p:nvSpPr>
         <p:spPr>
           <a:xfrm>
-            <a:off x="2847472" y="1211542"/>
+            <a:off x="1810338" y="1211542"/>
             <a:ext cx="1844842" cy="788737"/>
           </a:xfrm>
           <a:prstGeom prst="ellipse">
@@ -3374,7 +3374,7 @@
         </p:nvSpPr>
         <p:spPr>
           <a:xfrm>
-            <a:off x="4863430" y="1717842"/>
+            <a:off x="3826296" y="1717842"/>
             <a:ext cx="1844842" cy="788737"/>
           </a:xfrm>
           <a:prstGeom prst="ellipse">
@@ -3416,7 +3416,7 @@
         </p:nvSpPr>
         <p:spPr>
           <a:xfrm>
-            <a:off x="2780631" y="2237874"/>
+            <a:off x="1743497" y="2237874"/>
             <a:ext cx="1844842" cy="788737"/>
           </a:xfrm>
           <a:prstGeom prst="ellipse">
@@ -3458,7 +3458,7 @@
         </p:nvSpPr>
         <p:spPr>
           <a:xfrm>
-            <a:off x="4783220" y="2749884"/>
+            <a:off x="3746086" y="2749884"/>
             <a:ext cx="1844842" cy="788737"/>
           </a:xfrm>
           <a:prstGeom prst="ellipse">
@@ -3486,7 +3486,11 @@
             <a:pPr algn="ctr"/>
             <a:r>
               <a:rPr lang="en-US" dirty="0" smtClean="0"/>
-              <a:t>Account Settings</a:t>
+              <a:t>Edit Account </a:t>
+            </a:r>
+            <a:r>
+              <a:rPr lang="en-US" dirty="0" smtClean="0"/>
+              <a:t>Settings</a:t>
             </a:r>
             <a:endParaRPr lang="en-US" dirty="0"/>
           </a:p>
@@ -3494,13 +3498,13 @@
       </p:sp>
       <p:sp>
         <p:nvSpPr>
-          <p:cNvPr id="13" name="Oval 12"/>
+          <p:cNvPr id="14" name="Oval 13"/>
           <p:cNvSpPr/>
           <p:nvPr/>
         </p:nvSpPr>
         <p:spPr>
           <a:xfrm>
-            <a:off x="2850146" y="3213769"/>
+            <a:off x="3655180" y="4990431"/>
             <a:ext cx="1844842" cy="788737"/>
           </a:xfrm>
           <a:prstGeom prst="ellipse">
@@ -3528,7 +3532,7 @@
             <a:pPr algn="ctr"/>
             <a:r>
               <a:rPr lang="en-US" dirty="0" smtClean="0"/>
-              <a:t>User Preferences</a:t>
+              <a:t>Current Road Activities</a:t>
             </a:r>
             <a:endParaRPr lang="en-US" dirty="0"/>
           </a:p>
@@ -3536,13 +3540,13 @@
       </p:sp>
       <p:sp>
         <p:nvSpPr>
-          <p:cNvPr id="14" name="Oval 13"/>
+          <p:cNvPr id="15" name="Oval 14"/>
           <p:cNvSpPr/>
           <p:nvPr/>
         </p:nvSpPr>
         <p:spPr>
           <a:xfrm>
-            <a:off x="4692314" y="4990431"/>
+            <a:off x="1813012" y="5384800"/>
             <a:ext cx="1844842" cy="788737"/>
           </a:xfrm>
           <a:prstGeom prst="ellipse">
@@ -3570,7 +3574,7 @@
             <a:pPr algn="ctr"/>
             <a:r>
               <a:rPr lang="en-US" dirty="0" smtClean="0"/>
-              <a:t>Current Road Activities</a:t>
+              <a:t>Sign In</a:t>
             </a:r>
             <a:endParaRPr lang="en-US" dirty="0"/>
           </a:p>
@@ -3578,13 +3582,13 @@
       </p:sp>
       <p:sp>
         <p:nvSpPr>
-          <p:cNvPr id="15" name="Oval 14"/>
+          <p:cNvPr id="16" name="Oval 15"/>
           <p:cNvSpPr/>
           <p:nvPr/>
         </p:nvSpPr>
         <p:spPr>
           <a:xfrm>
-            <a:off x="2850146" y="5384800"/>
+            <a:off x="3746086" y="5882105"/>
             <a:ext cx="1844842" cy="788737"/>
           </a:xfrm>
           <a:prstGeom prst="ellipse">
@@ -3612,48 +3616,6 @@
             <a:pPr algn="ctr"/>
             <a:r>
               <a:rPr lang="en-US" dirty="0" smtClean="0"/>
-              <a:t>Sign In</a:t>
-            </a:r>
-            <a:endParaRPr lang="en-US" dirty="0"/>
-          </a:p>
-        </p:txBody>
-      </p:sp>
-      <p:sp>
-        <p:nvSpPr>
-          <p:cNvPr id="16" name="Oval 15"/>
-          <p:cNvSpPr/>
-          <p:nvPr/>
-        </p:nvSpPr>
-        <p:spPr>
-          <a:xfrm>
-            <a:off x="4783220" y="5882105"/>
-            <a:ext cx="1844842" cy="788737"/>
-          </a:xfrm>
-          <a:prstGeom prst="ellipse">
-            <a:avLst/>
-          </a:prstGeom>
-        </p:spPr>
-        <p:style>
-          <a:lnRef idx="1">
-            <a:schemeClr val="accent1"/>
-          </a:lnRef>
-          <a:fillRef idx="3">
-            <a:schemeClr val="accent1"/>
-          </a:fillRef>
-          <a:effectRef idx="2">
-            <a:schemeClr val="accent1"/>
-          </a:effectRef>
-          <a:fontRef idx="minor">
-            <a:schemeClr val="lt1"/>
-          </a:fontRef>
-        </p:style>
-        <p:txBody>
-          <a:bodyPr rtlCol="0" anchor="ctr"/>
-          <a:lstStyle/>
-          <a:p>
-            <a:pPr algn="ctr"/>
-            <a:r>
-              <a:rPr lang="en-US" dirty="0" smtClean="0"/>
               <a:t>Sign Out</a:t>
             </a:r>
             <a:endParaRPr lang="en-US" dirty="0"/>
@@ -3668,7 +3630,7 @@
         </p:nvGrpSpPr>
         <p:grpSpPr>
           <a:xfrm>
-            <a:off x="1243265" y="2749884"/>
+            <a:off x="85836" y="2770828"/>
             <a:ext cx="494632" cy="1029369"/>
             <a:chOff x="962523" y="935789"/>
             <a:chExt cx="494632" cy="1029369"/>
@@ -3843,7 +3805,7 @@
         </p:nvGrpSpPr>
         <p:grpSpPr>
           <a:xfrm>
-            <a:off x="633666" y="688473"/>
+            <a:off x="18432" y="715208"/>
             <a:ext cx="494632" cy="1029369"/>
             <a:chOff x="962523" y="935789"/>
             <a:chExt cx="494632" cy="1029369"/>
@@ -4018,7 +3980,7 @@
         </p:nvGrpSpPr>
         <p:grpSpPr>
           <a:xfrm>
-            <a:off x="727242" y="5130800"/>
+            <a:off x="59993" y="5130800"/>
             <a:ext cx="494632" cy="1029369"/>
             <a:chOff x="962523" y="935789"/>
             <a:chExt cx="494632" cy="1029369"/>
@@ -4193,7 +4155,7 @@
         </p:nvSpPr>
         <p:spPr>
           <a:xfrm>
-            <a:off x="513064" y="1717842"/>
+            <a:off x="45026" y="1744577"/>
             <a:ext cx="748923" cy="369332"/>
           </a:xfrm>
           <a:prstGeom prst="rect">
@@ -4237,7 +4199,7 @@
         </p:nvSpPr>
         <p:spPr>
           <a:xfrm>
-            <a:off x="1186927" y="3831025"/>
+            <a:off x="109146" y="3800055"/>
             <a:ext cx="620683" cy="369332"/>
           </a:xfrm>
           <a:prstGeom prst="rect">
@@ -4281,7 +4243,7 @@
         </p:nvSpPr>
         <p:spPr>
           <a:xfrm>
-            <a:off x="593272" y="6173537"/>
+            <a:off x="109146" y="6173537"/>
             <a:ext cx="862060" cy="369332"/>
           </a:xfrm>
           <a:prstGeom prst="rect">
@@ -4327,7 +4289,7 @@
         </p:nvCxnSpPr>
         <p:spPr>
           <a:xfrm flipH="1">
-            <a:off x="1807610" y="661737"/>
+            <a:off x="770476" y="661737"/>
             <a:ext cx="1210978" cy="2629567"/>
           </a:xfrm>
           <a:prstGeom prst="line">
@@ -4359,7 +4321,7 @@
         </p:nvCxnSpPr>
         <p:spPr>
           <a:xfrm flipH="1">
-            <a:off x="1807610" y="1605911"/>
+            <a:off x="770476" y="1605911"/>
             <a:ext cx="1039862" cy="1685393"/>
           </a:xfrm>
           <a:prstGeom prst="line">
@@ -4391,7 +4353,7 @@
         </p:nvCxnSpPr>
         <p:spPr>
           <a:xfrm flipH="1">
-            <a:off x="1807610" y="2632243"/>
+            <a:off x="770476" y="2632243"/>
             <a:ext cx="973021" cy="659061"/>
           </a:xfrm>
           <a:prstGeom prst="line">
@@ -4416,14 +4378,12 @@
       <p:cxnSp>
         <p:nvCxnSpPr>
           <p:cNvPr id="56" name="Straight Connector 55"/>
-          <p:cNvCxnSpPr>
-            <a:stCxn id="13" idx="2"/>
-          </p:cNvCxnSpPr>
+          <p:cNvCxnSpPr/>
           <p:nvPr/>
         </p:nvCxnSpPr>
         <p:spPr>
           <a:xfrm flipH="1" flipV="1">
-            <a:off x="1807610" y="3291304"/>
+            <a:off x="770476" y="3291304"/>
             <a:ext cx="1042536" cy="316834"/>
           </a:xfrm>
           <a:prstGeom prst="line">
@@ -4455,8 +4415,8 @@
         </p:nvCxnSpPr>
         <p:spPr>
           <a:xfrm flipH="1">
-            <a:off x="1350216" y="4596063"/>
-            <a:ext cx="1443782" cy="1076157"/>
+            <a:off x="580468" y="4596063"/>
+            <a:ext cx="1176396" cy="922422"/>
           </a:xfrm>
           <a:prstGeom prst="line">
             <a:avLst/>
@@ -4487,7 +4447,7 @@
         </p:nvCxnSpPr>
         <p:spPr>
           <a:xfrm flipH="1">
-            <a:off x="2780631" y="2112211"/>
+            <a:off x="1743497" y="2112211"/>
             <a:ext cx="2082799" cy="125663"/>
           </a:xfrm>
           <a:prstGeom prst="line">
@@ -4517,7 +4477,7 @@
         </p:nvCxnSpPr>
         <p:spPr>
           <a:xfrm flipH="1">
-            <a:off x="1807610" y="2237874"/>
+            <a:off x="770476" y="2237874"/>
             <a:ext cx="986389" cy="1053430"/>
           </a:xfrm>
           <a:prstGeom prst="line">
@@ -4549,7 +4509,7 @@
         </p:nvCxnSpPr>
         <p:spPr>
           <a:xfrm flipH="1">
-            <a:off x="1807610" y="3144253"/>
+            <a:off x="770476" y="3144253"/>
             <a:ext cx="2975610" cy="65506"/>
           </a:xfrm>
           <a:prstGeom prst="line">
@@ -4581,7 +4541,7 @@
         </p:nvCxnSpPr>
         <p:spPr>
           <a:xfrm flipH="1" flipV="1">
-            <a:off x="2780631" y="4002506"/>
+            <a:off x="1743497" y="4002506"/>
             <a:ext cx="1914357" cy="65506"/>
           </a:xfrm>
           <a:prstGeom prst="line">
@@ -4611,7 +4571,7 @@
         </p:nvCxnSpPr>
         <p:spPr>
           <a:xfrm flipH="1" flipV="1">
-            <a:off x="1807610" y="3291304"/>
+            <a:off x="770476" y="3291304"/>
             <a:ext cx="986389" cy="711202"/>
           </a:xfrm>
           <a:prstGeom prst="line">
@@ -4643,8 +4603,8 @@
         </p:nvCxnSpPr>
         <p:spPr>
           <a:xfrm>
-            <a:off x="1186927" y="1211542"/>
-            <a:ext cx="1660545" cy="394369"/>
+            <a:off x="770476" y="1211542"/>
+            <a:ext cx="1039862" cy="394369"/>
           </a:xfrm>
           <a:prstGeom prst="line">
             <a:avLst/>
@@ -4673,8 +4633,8 @@
         </p:nvCxnSpPr>
         <p:spPr>
           <a:xfrm flipH="1">
-            <a:off x="1186927" y="1056105"/>
-            <a:ext cx="3596293" cy="155437"/>
+            <a:off x="770476" y="1056105"/>
+            <a:ext cx="2975611" cy="115330"/>
           </a:xfrm>
           <a:prstGeom prst="line">
             <a:avLst/>
@@ -4705,7 +4665,7 @@
         </p:nvCxnSpPr>
         <p:spPr>
           <a:xfrm flipH="1" flipV="1">
-            <a:off x="2112211" y="4852737"/>
+            <a:off x="1075077" y="4852737"/>
             <a:ext cx="2580103" cy="532063"/>
           </a:xfrm>
           <a:prstGeom prst="line">
@@ -4735,7 +4695,7 @@
         </p:nvCxnSpPr>
         <p:spPr>
           <a:xfrm flipH="1" flipV="1">
-            <a:off x="1807611" y="3291305"/>
+            <a:off x="770477" y="3291305"/>
             <a:ext cx="304600" cy="1561432"/>
           </a:xfrm>
           <a:prstGeom prst="line">
@@ -4767,7 +4727,7 @@
         </p:nvCxnSpPr>
         <p:spPr>
           <a:xfrm flipH="1" flipV="1">
-            <a:off x="1938421" y="4990431"/>
+            <a:off x="901287" y="4990431"/>
             <a:ext cx="911725" cy="788738"/>
           </a:xfrm>
           <a:prstGeom prst="line">
@@ -4797,7 +4757,7 @@
         </p:nvCxnSpPr>
         <p:spPr>
           <a:xfrm flipH="1" flipV="1">
-            <a:off x="1807610" y="3291304"/>
+            <a:off x="770476" y="3291304"/>
             <a:ext cx="130811" cy="1699127"/>
           </a:xfrm>
           <a:prstGeom prst="line">
@@ -4829,7 +4789,7 @@
         </p:nvCxnSpPr>
         <p:spPr>
           <a:xfrm flipH="1" flipV="1">
-            <a:off x="1807611" y="5912853"/>
+            <a:off x="770477" y="5912853"/>
             <a:ext cx="2975609" cy="363621"/>
           </a:xfrm>
           <a:prstGeom prst="line">
@@ -4859,8 +4819,677 @@
         </p:nvCxnSpPr>
         <p:spPr>
           <a:xfrm flipV="1">
-            <a:off x="1807610" y="3291304"/>
+            <a:off x="770476" y="3291304"/>
             <a:ext cx="0" cy="2621549"/>
+          </a:xfrm>
+          <a:prstGeom prst="line">
+            <a:avLst/>
+          </a:prstGeom>
+        </p:spPr>
+        <p:style>
+          <a:lnRef idx="2">
+            <a:schemeClr val="accent1"/>
+          </a:lnRef>
+          <a:fillRef idx="0">
+            <a:schemeClr val="accent1"/>
+          </a:fillRef>
+          <a:effectRef idx="1">
+            <a:schemeClr val="accent1"/>
+          </a:effectRef>
+          <a:fontRef idx="minor">
+            <a:schemeClr val="tx1"/>
+          </a:fontRef>
+        </p:style>
+      </p:cxnSp>
+      <p:sp>
+        <p:nvSpPr>
+          <p:cNvPr id="54" name="Oval 53"/>
+          <p:cNvSpPr/>
+          <p:nvPr/>
+        </p:nvSpPr>
+        <p:spPr>
+          <a:xfrm>
+            <a:off x="5502696" y="320839"/>
+            <a:ext cx="1844842" cy="788737"/>
+          </a:xfrm>
+          <a:prstGeom prst="ellipse">
+            <a:avLst/>
+          </a:prstGeom>
+        </p:spPr>
+        <p:style>
+          <a:lnRef idx="1">
+            <a:schemeClr val="accent1"/>
+          </a:lnRef>
+          <a:fillRef idx="3">
+            <a:schemeClr val="accent1"/>
+          </a:fillRef>
+          <a:effectRef idx="2">
+            <a:schemeClr val="accent1"/>
+          </a:effectRef>
+          <a:fontRef idx="minor">
+            <a:schemeClr val="lt1"/>
+          </a:fontRef>
+        </p:style>
+        <p:txBody>
+          <a:bodyPr rtlCol="0" anchor="ctr"/>
+          <a:lstStyle/>
+          <a:p>
+            <a:pPr algn="ctr"/>
+            <a:r>
+              <a:rPr lang="en-US" dirty="0" smtClean="0"/>
+              <a:t>Subscribe to Alerts</a:t>
+            </a:r>
+            <a:endParaRPr lang="en-US" dirty="0"/>
+          </a:p>
+        </p:txBody>
+      </p:sp>
+      <p:sp>
+        <p:nvSpPr>
+          <p:cNvPr id="57" name="Oval 56"/>
+          <p:cNvSpPr/>
+          <p:nvPr/>
+        </p:nvSpPr>
+        <p:spPr>
+          <a:xfrm>
+            <a:off x="5500022" y="1245654"/>
+            <a:ext cx="1844842" cy="788737"/>
+          </a:xfrm>
+          <a:prstGeom prst="ellipse">
+            <a:avLst/>
+          </a:prstGeom>
+        </p:spPr>
+        <p:style>
+          <a:lnRef idx="1">
+            <a:schemeClr val="accent1"/>
+          </a:lnRef>
+          <a:fillRef idx="3">
+            <a:schemeClr val="accent1"/>
+          </a:fillRef>
+          <a:effectRef idx="2">
+            <a:schemeClr val="accent1"/>
+          </a:effectRef>
+          <a:fontRef idx="minor">
+            <a:schemeClr val="lt1"/>
+          </a:fontRef>
+        </p:style>
+        <p:txBody>
+          <a:bodyPr rtlCol="0" anchor="ctr"/>
+          <a:lstStyle/>
+          <a:p>
+            <a:pPr algn="ctr"/>
+            <a:r>
+              <a:rPr lang="en-US" dirty="0" smtClean="0"/>
+              <a:t>Uns</a:t>
+            </a:r>
+            <a:r>
+              <a:rPr lang="en-US" dirty="0" smtClean="0"/>
+              <a:t>ubscribe to Alerts</a:t>
+            </a:r>
+            <a:endParaRPr lang="en-US" dirty="0"/>
+          </a:p>
+        </p:txBody>
+      </p:sp>
+      <p:sp>
+        <p:nvSpPr>
+          <p:cNvPr id="58" name="Oval 57"/>
+          <p:cNvSpPr/>
+          <p:nvPr/>
+        </p:nvSpPr>
+        <p:spPr>
+          <a:xfrm>
+            <a:off x="5590928" y="2355515"/>
+            <a:ext cx="1844842" cy="788737"/>
+          </a:xfrm>
+          <a:prstGeom prst="ellipse">
+            <a:avLst/>
+          </a:prstGeom>
+        </p:spPr>
+        <p:style>
+          <a:lnRef idx="1">
+            <a:schemeClr val="accent1"/>
+          </a:lnRef>
+          <a:fillRef idx="3">
+            <a:schemeClr val="accent1"/>
+          </a:fillRef>
+          <a:effectRef idx="2">
+            <a:schemeClr val="accent1"/>
+          </a:effectRef>
+          <a:fontRef idx="minor">
+            <a:schemeClr val="lt1"/>
+          </a:fontRef>
+        </p:style>
+        <p:txBody>
+          <a:bodyPr rtlCol="0" anchor="ctr"/>
+          <a:lstStyle/>
+          <a:p>
+            <a:pPr algn="ctr"/>
+            <a:r>
+              <a:rPr lang="en-US" dirty="0" smtClean="0"/>
+              <a:t>View all Paths</a:t>
+            </a:r>
+            <a:endParaRPr lang="en-US" dirty="0"/>
+          </a:p>
+        </p:txBody>
+      </p:sp>
+      <p:sp>
+        <p:nvSpPr>
+          <p:cNvPr id="60" name="Oval 59"/>
+          <p:cNvSpPr/>
+          <p:nvPr/>
+        </p:nvSpPr>
+        <p:spPr>
+          <a:xfrm>
+            <a:off x="5590928" y="3441445"/>
+            <a:ext cx="1844842" cy="788737"/>
+          </a:xfrm>
+          <a:prstGeom prst="ellipse">
+            <a:avLst/>
+          </a:prstGeom>
+        </p:spPr>
+        <p:style>
+          <a:lnRef idx="1">
+            <a:schemeClr val="accent1"/>
+          </a:lnRef>
+          <a:fillRef idx="3">
+            <a:schemeClr val="accent1"/>
+          </a:fillRef>
+          <a:effectRef idx="2">
+            <a:schemeClr val="accent1"/>
+          </a:effectRef>
+          <a:fontRef idx="minor">
+            <a:schemeClr val="lt1"/>
+          </a:fontRef>
+        </p:style>
+        <p:txBody>
+          <a:bodyPr rtlCol="0" anchor="ctr"/>
+          <a:lstStyle/>
+          <a:p>
+            <a:pPr algn="ctr"/>
+            <a:r>
+              <a:rPr lang="en-US" dirty="0" smtClean="0"/>
+              <a:t>Edit Path</a:t>
+            </a:r>
+            <a:endParaRPr lang="en-US" dirty="0"/>
+          </a:p>
+        </p:txBody>
+      </p:sp>
+      <p:sp>
+        <p:nvSpPr>
+          <p:cNvPr id="61" name="Oval 60"/>
+          <p:cNvSpPr/>
+          <p:nvPr/>
+        </p:nvSpPr>
+        <p:spPr>
+          <a:xfrm>
+            <a:off x="5671138" y="4458368"/>
+            <a:ext cx="1844842" cy="788737"/>
+          </a:xfrm>
+          <a:prstGeom prst="ellipse">
+            <a:avLst/>
+          </a:prstGeom>
+        </p:spPr>
+        <p:style>
+          <a:lnRef idx="1">
+            <a:schemeClr val="accent1"/>
+          </a:lnRef>
+          <a:fillRef idx="3">
+            <a:schemeClr val="accent1"/>
+          </a:fillRef>
+          <a:effectRef idx="2">
+            <a:schemeClr val="accent1"/>
+          </a:effectRef>
+          <a:fontRef idx="minor">
+            <a:schemeClr val="lt1"/>
+          </a:fontRef>
+        </p:style>
+        <p:txBody>
+          <a:bodyPr rtlCol="0" anchor="ctr"/>
+          <a:lstStyle/>
+          <a:p>
+            <a:pPr algn="ctr"/>
+            <a:r>
+              <a:rPr lang="en-US" dirty="0" smtClean="0"/>
+              <a:t>Remove Path</a:t>
+            </a:r>
+            <a:endParaRPr lang="en-US" dirty="0"/>
+          </a:p>
+        </p:txBody>
+      </p:sp>
+      <p:sp>
+        <p:nvSpPr>
+          <p:cNvPr id="62" name="Oval 61"/>
+          <p:cNvSpPr/>
+          <p:nvPr/>
+        </p:nvSpPr>
+        <p:spPr>
+          <a:xfrm>
+            <a:off x="1810338" y="3213769"/>
+            <a:ext cx="1844842" cy="788737"/>
+          </a:xfrm>
+          <a:prstGeom prst="ellipse">
+            <a:avLst/>
+          </a:prstGeom>
+        </p:spPr>
+        <p:style>
+          <a:lnRef idx="1">
+            <a:schemeClr val="accent1"/>
+          </a:lnRef>
+          <a:fillRef idx="3">
+            <a:schemeClr val="accent1"/>
+          </a:fillRef>
+          <a:effectRef idx="2">
+            <a:schemeClr val="accent1"/>
+          </a:effectRef>
+          <a:fontRef idx="minor">
+            <a:schemeClr val="lt1"/>
+          </a:fontRef>
+        </p:style>
+        <p:txBody>
+          <a:bodyPr rtlCol="0" anchor="ctr"/>
+          <a:lstStyle/>
+          <a:p>
+            <a:pPr algn="ctr"/>
+            <a:r>
+              <a:rPr lang="en-US" dirty="0" smtClean="0"/>
+              <a:t>View Account </a:t>
+            </a:r>
+            <a:r>
+              <a:rPr lang="en-US" dirty="0" smtClean="0"/>
+              <a:t>Settings</a:t>
+            </a:r>
+            <a:endParaRPr lang="en-US" dirty="0"/>
+          </a:p>
+        </p:txBody>
+      </p:sp>
+      <p:cxnSp>
+        <p:nvCxnSpPr>
+          <p:cNvPr id="47" name="Straight Connector 46"/>
+          <p:cNvCxnSpPr/>
+          <p:nvPr/>
+        </p:nvCxnSpPr>
+        <p:spPr>
+          <a:xfrm flipH="1" flipV="1">
+            <a:off x="770477" y="3291305"/>
+            <a:ext cx="404306" cy="776707"/>
+          </a:xfrm>
+          <a:prstGeom prst="line">
+            <a:avLst/>
+          </a:prstGeom>
+        </p:spPr>
+        <p:style>
+          <a:lnRef idx="2">
+            <a:schemeClr val="accent1"/>
+          </a:lnRef>
+          <a:fillRef idx="0">
+            <a:schemeClr val="accent1"/>
+          </a:fillRef>
+          <a:effectRef idx="1">
+            <a:schemeClr val="accent1"/>
+          </a:effectRef>
+          <a:fontRef idx="minor">
+            <a:schemeClr val="tx1"/>
+          </a:fontRef>
+        </p:style>
+      </p:cxnSp>
+      <p:grpSp>
+        <p:nvGrpSpPr>
+          <p:cNvPr id="76" name="Group 75"/>
+          <p:cNvGrpSpPr/>
+          <p:nvPr/>
+        </p:nvGrpSpPr>
+        <p:grpSpPr>
+          <a:xfrm>
+            <a:off x="8504299" y="2469592"/>
+            <a:ext cx="494632" cy="1029369"/>
+            <a:chOff x="962523" y="935789"/>
+            <a:chExt cx="494632" cy="1029369"/>
+          </a:xfrm>
+        </p:grpSpPr>
+        <p:sp>
+          <p:nvSpPr>
+            <p:cNvPr id="77" name="Oval 76"/>
+            <p:cNvSpPr/>
+            <p:nvPr/>
+          </p:nvSpPr>
+          <p:spPr>
+            <a:xfrm>
+              <a:off x="1069474" y="935789"/>
+              <a:ext cx="294105" cy="387685"/>
+            </a:xfrm>
+            <a:prstGeom prst="ellipse">
+              <a:avLst/>
+            </a:prstGeom>
+          </p:spPr>
+          <p:style>
+            <a:lnRef idx="1">
+              <a:schemeClr val="accent1"/>
+            </a:lnRef>
+            <a:fillRef idx="3">
+              <a:schemeClr val="accent1"/>
+            </a:fillRef>
+            <a:effectRef idx="2">
+              <a:schemeClr val="accent1"/>
+            </a:effectRef>
+            <a:fontRef idx="minor">
+              <a:schemeClr val="lt1"/>
+            </a:fontRef>
+          </p:style>
+          <p:txBody>
+            <a:bodyPr rtlCol="0" anchor="ctr"/>
+            <a:lstStyle/>
+            <a:p>
+              <a:pPr algn="ctr"/>
+              <a:endParaRPr lang="en-US"/>
+            </a:p>
+          </p:txBody>
+        </p:sp>
+        <p:cxnSp>
+          <p:nvCxnSpPr>
+            <p:cNvPr id="78" name="Straight Connector 77"/>
+            <p:cNvCxnSpPr>
+              <a:stCxn id="77" idx="4"/>
+            </p:cNvCxnSpPr>
+            <p:nvPr/>
+          </p:nvCxnSpPr>
+          <p:spPr>
+            <a:xfrm>
+              <a:off x="1216527" y="1323474"/>
+              <a:ext cx="0" cy="394368"/>
+            </a:xfrm>
+            <a:prstGeom prst="line">
+              <a:avLst/>
+            </a:prstGeom>
+          </p:spPr>
+          <p:style>
+            <a:lnRef idx="2">
+              <a:schemeClr val="accent1"/>
+            </a:lnRef>
+            <a:fillRef idx="0">
+              <a:schemeClr val="accent1"/>
+            </a:fillRef>
+            <a:effectRef idx="1">
+              <a:schemeClr val="accent1"/>
+            </a:effectRef>
+            <a:fontRef idx="minor">
+              <a:schemeClr val="tx1"/>
+            </a:fontRef>
+          </p:style>
+        </p:cxnSp>
+        <p:cxnSp>
+          <p:nvCxnSpPr>
+            <p:cNvPr id="80" name="Straight Connector 79"/>
+            <p:cNvCxnSpPr/>
+            <p:nvPr/>
+          </p:nvCxnSpPr>
+          <p:spPr>
+            <a:xfrm flipH="1">
+              <a:off x="1069474" y="1717842"/>
+              <a:ext cx="147053" cy="247316"/>
+            </a:xfrm>
+            <a:prstGeom prst="line">
+              <a:avLst/>
+            </a:prstGeom>
+          </p:spPr>
+          <p:style>
+            <a:lnRef idx="2">
+              <a:schemeClr val="accent1"/>
+            </a:lnRef>
+            <a:fillRef idx="0">
+              <a:schemeClr val="accent1"/>
+            </a:fillRef>
+            <a:effectRef idx="1">
+              <a:schemeClr val="accent1"/>
+            </a:effectRef>
+            <a:fontRef idx="minor">
+              <a:schemeClr val="tx1"/>
+            </a:fontRef>
+          </p:style>
+        </p:cxnSp>
+        <p:cxnSp>
+          <p:nvCxnSpPr>
+            <p:cNvPr id="82" name="Straight Connector 81"/>
+            <p:cNvCxnSpPr/>
+            <p:nvPr/>
+          </p:nvCxnSpPr>
+          <p:spPr>
+            <a:xfrm>
+              <a:off x="1216527" y="1717842"/>
+              <a:ext cx="147052" cy="247316"/>
+            </a:xfrm>
+            <a:prstGeom prst="line">
+              <a:avLst/>
+            </a:prstGeom>
+          </p:spPr>
+          <p:style>
+            <a:lnRef idx="2">
+              <a:schemeClr val="accent1"/>
+            </a:lnRef>
+            <a:fillRef idx="0">
+              <a:schemeClr val="accent1"/>
+            </a:fillRef>
+            <a:effectRef idx="1">
+              <a:schemeClr val="accent1"/>
+            </a:effectRef>
+            <a:fontRef idx="minor">
+              <a:schemeClr val="tx1"/>
+            </a:fontRef>
+          </p:style>
+        </p:cxnSp>
+        <p:cxnSp>
+          <p:nvCxnSpPr>
+            <p:cNvPr id="83" name="Straight Connector 82"/>
+            <p:cNvCxnSpPr/>
+            <p:nvPr/>
+          </p:nvCxnSpPr>
+          <p:spPr>
+            <a:xfrm>
+              <a:off x="962523" y="1477209"/>
+              <a:ext cx="494632" cy="0"/>
+            </a:xfrm>
+            <a:prstGeom prst="line">
+              <a:avLst/>
+            </a:prstGeom>
+          </p:spPr>
+          <p:style>
+            <a:lnRef idx="2">
+              <a:schemeClr val="accent1"/>
+            </a:lnRef>
+            <a:fillRef idx="0">
+              <a:schemeClr val="accent1"/>
+            </a:fillRef>
+            <a:effectRef idx="1">
+              <a:schemeClr val="accent1"/>
+            </a:effectRef>
+            <a:fontRef idx="minor">
+              <a:schemeClr val="tx1"/>
+            </a:fontRef>
+          </p:style>
+        </p:cxnSp>
+      </p:grpSp>
+      <p:sp>
+        <p:nvSpPr>
+          <p:cNvPr id="84" name="TextBox 83"/>
+          <p:cNvSpPr txBox="1"/>
+          <p:nvPr/>
+        </p:nvSpPr>
+        <p:spPr>
+          <a:xfrm>
+            <a:off x="8527609" y="3498819"/>
+            <a:ext cx="620683" cy="369332"/>
+          </a:xfrm>
+          <a:prstGeom prst="rect">
+            <a:avLst/>
+          </a:prstGeom>
+          <a:noFill/>
+        </p:spPr>
+        <p:txBody>
+          <a:bodyPr wrap="none" rtlCol="0">
+            <a:spAutoFit/>
+          </a:bodyPr>
+          <a:lstStyle/>
+          <a:p>
+            <a:r>
+              <a:rPr lang="en-US" dirty="0" smtClean="0">
+                <a:solidFill>
+                  <a:schemeClr val="tx2">
+                    <a:lumMod val="60000"/>
+                    <a:lumOff val="40000"/>
+                  </a:schemeClr>
+                </a:solidFill>
+              </a:rPr>
+              <a:t>User</a:t>
+            </a:r>
+            <a:endParaRPr lang="en-US" dirty="0">
+              <a:solidFill>
+                <a:schemeClr val="tx2">
+                  <a:lumMod val="60000"/>
+                  <a:lumOff val="40000"/>
+                </a:schemeClr>
+              </a:solidFill>
+            </a:endParaRPr>
+          </a:p>
+        </p:txBody>
+      </p:sp>
+      <p:cxnSp>
+        <p:nvCxnSpPr>
+          <p:cNvPr id="64" name="Straight Connector 63"/>
+          <p:cNvCxnSpPr>
+            <a:endCxn id="54" idx="6"/>
+          </p:cNvCxnSpPr>
+          <p:nvPr/>
+        </p:nvCxnSpPr>
+        <p:spPr>
+          <a:xfrm flipH="1" flipV="1">
+            <a:off x="7347538" y="715208"/>
+            <a:ext cx="847191" cy="2233945"/>
+          </a:xfrm>
+          <a:prstGeom prst="line">
+            <a:avLst/>
+          </a:prstGeom>
+        </p:spPr>
+        <p:style>
+          <a:lnRef idx="2">
+            <a:schemeClr val="accent1"/>
+          </a:lnRef>
+          <a:fillRef idx="0">
+            <a:schemeClr val="accent1"/>
+          </a:fillRef>
+          <a:effectRef idx="1">
+            <a:schemeClr val="accent1"/>
+          </a:effectRef>
+          <a:fontRef idx="minor">
+            <a:schemeClr val="tx1"/>
+          </a:fontRef>
+        </p:style>
+      </p:cxnSp>
+      <p:cxnSp>
+        <p:nvCxnSpPr>
+          <p:cNvPr id="66" name="Straight Connector 65"/>
+          <p:cNvCxnSpPr>
+            <a:endCxn id="57" idx="6"/>
+          </p:cNvCxnSpPr>
+          <p:nvPr/>
+        </p:nvCxnSpPr>
+        <p:spPr>
+          <a:xfrm flipH="1" flipV="1">
+            <a:off x="7344864" y="1640023"/>
+            <a:ext cx="847191" cy="1308407"/>
+          </a:xfrm>
+          <a:prstGeom prst="line">
+            <a:avLst/>
+          </a:prstGeom>
+        </p:spPr>
+        <p:style>
+          <a:lnRef idx="2">
+            <a:schemeClr val="accent1"/>
+          </a:lnRef>
+          <a:fillRef idx="0">
+            <a:schemeClr val="accent1"/>
+          </a:fillRef>
+          <a:effectRef idx="1">
+            <a:schemeClr val="accent1"/>
+          </a:effectRef>
+          <a:fontRef idx="minor">
+            <a:schemeClr val="tx1"/>
+          </a:fontRef>
+        </p:style>
+      </p:cxnSp>
+      <p:cxnSp>
+        <p:nvCxnSpPr>
+          <p:cNvPr id="68" name="Straight Connector 67"/>
+          <p:cNvCxnSpPr>
+            <a:endCxn id="58" idx="6"/>
+          </p:cNvCxnSpPr>
+          <p:nvPr/>
+        </p:nvCxnSpPr>
+        <p:spPr>
+          <a:xfrm flipH="1" flipV="1">
+            <a:off x="7435770" y="2749884"/>
+            <a:ext cx="956814" cy="276727"/>
+          </a:xfrm>
+          <a:prstGeom prst="line">
+            <a:avLst/>
+          </a:prstGeom>
+        </p:spPr>
+        <p:style>
+          <a:lnRef idx="2">
+            <a:schemeClr val="accent1"/>
+          </a:lnRef>
+          <a:fillRef idx="0">
+            <a:schemeClr val="accent1"/>
+          </a:fillRef>
+          <a:effectRef idx="1">
+            <a:schemeClr val="accent1"/>
+          </a:effectRef>
+          <a:fontRef idx="minor">
+            <a:schemeClr val="tx1"/>
+          </a:fontRef>
+        </p:style>
+      </p:cxnSp>
+      <p:cxnSp>
+        <p:nvCxnSpPr>
+          <p:cNvPr id="72" name="Straight Connector 71"/>
+          <p:cNvCxnSpPr>
+            <a:endCxn id="60" idx="6"/>
+          </p:cNvCxnSpPr>
+          <p:nvPr/>
+        </p:nvCxnSpPr>
+        <p:spPr>
+          <a:xfrm flipH="1">
+            <a:off x="7435770" y="3031400"/>
+            <a:ext cx="847191" cy="804414"/>
+          </a:xfrm>
+          <a:prstGeom prst="line">
+            <a:avLst/>
+          </a:prstGeom>
+        </p:spPr>
+        <p:style>
+          <a:lnRef idx="2">
+            <a:schemeClr val="accent1"/>
+          </a:lnRef>
+          <a:fillRef idx="0">
+            <a:schemeClr val="accent1"/>
+          </a:fillRef>
+          <a:effectRef idx="1">
+            <a:schemeClr val="accent1"/>
+          </a:effectRef>
+          <a:fontRef idx="minor">
+            <a:schemeClr val="tx1"/>
+          </a:fontRef>
+        </p:style>
+      </p:cxnSp>
+      <p:cxnSp>
+        <p:nvCxnSpPr>
+          <p:cNvPr id="74" name="Straight Connector 73"/>
+          <p:cNvCxnSpPr>
+            <a:endCxn id="61" idx="6"/>
+          </p:cNvCxnSpPr>
+          <p:nvPr/>
+        </p:nvCxnSpPr>
+        <p:spPr>
+          <a:xfrm flipH="1">
+            <a:off x="7515980" y="3011012"/>
+            <a:ext cx="876603" cy="1841725"/>
           </a:xfrm>
           <a:prstGeom prst="line">
             <a:avLst/>

</xml_diff>

<commit_message>
Update to Use Case Model figure
</commit_message>
<xml_diff>
--- a/deliverables/inception/Other/UseCaseModelDiagram.pptx
+++ b/deliverables/inception/Other/UseCaseModelDiagram.pptx
@@ -7,6 +7,7 @@
   <p:sldIdLst>
     <p:sldId id="256" r:id="rId2"/>
     <p:sldId id="257" r:id="rId3"/>
+    <p:sldId id="258" r:id="rId4"/>
   </p:sldIdLst>
   <p:sldSz cx="9144000" cy="6858000" type="screen4x3"/>
   <p:notesSz cx="6858000" cy="9144000"/>
@@ -4849,7 +4850,7 @@
         </p:nvSpPr>
         <p:spPr>
           <a:xfrm>
-            <a:off x="5502696" y="320839"/>
+            <a:off x="5700550" y="382698"/>
             <a:ext cx="1844842" cy="788737"/>
           </a:xfrm>
           <a:prstGeom prst="ellipse">
@@ -5360,7 +5361,7 @@
         </p:nvCxnSpPr>
         <p:spPr>
           <a:xfrm flipH="1" flipV="1">
-            <a:off x="7347538" y="715208"/>
+            <a:off x="7545392" y="777067"/>
             <a:ext cx="847191" cy="2233945"/>
           </a:xfrm>
           <a:prstGeom prst="line">
@@ -7344,6 +7345,2509 @@
     <p:extLst>
       <p:ext uri="{BB962C8B-B14F-4D97-AF65-F5344CB8AC3E}">
         <p14:creationId xmlns:p14="http://schemas.microsoft.com/office/powerpoint/2010/main" val="90243005"/>
+      </p:ext>
+    </p:extLst>
+  </p:cSld>
+  <p:clrMapOvr>
+    <a:masterClrMapping/>
+  </p:clrMapOvr>
+</p:sld>
+</file>
+
+<file path=ppt/slides/slide3.xml><?xml version="1.0" encoding="utf-8"?>
+<p:sld xmlns:a="http://schemas.openxmlformats.org/drawingml/2006/main" xmlns:r="http://schemas.openxmlformats.org/officeDocument/2006/relationships" xmlns:p="http://schemas.openxmlformats.org/presentationml/2006/main">
+  <p:cSld>
+    <p:spTree>
+      <p:nvGrpSpPr>
+        <p:cNvPr id="1" name=""/>
+        <p:cNvGrpSpPr/>
+        <p:nvPr/>
+      </p:nvGrpSpPr>
+      <p:grpSpPr>
+        <a:xfrm>
+          <a:off x="0" y="0"/>
+          <a:ext cx="0" cy="0"/>
+          <a:chOff x="0" y="0"/>
+          <a:chExt cx="0" cy="0"/>
+        </a:xfrm>
+      </p:grpSpPr>
+      <p:grpSp>
+        <p:nvGrpSpPr>
+          <p:cNvPr id="79" name="Group 78"/>
+          <p:cNvGrpSpPr/>
+          <p:nvPr/>
+        </p:nvGrpSpPr>
+        <p:grpSpPr>
+          <a:xfrm>
+            <a:off x="22080" y="267368"/>
+            <a:ext cx="5671753" cy="3034632"/>
+            <a:chOff x="22080" y="267368"/>
+            <a:chExt cx="5671753" cy="3034632"/>
+          </a:xfrm>
+        </p:grpSpPr>
+        <p:sp>
+          <p:nvSpPr>
+            <p:cNvPr id="4" name="Rectangle 3"/>
+            <p:cNvSpPr/>
+            <p:nvPr/>
+          </p:nvSpPr>
+          <p:spPr>
+            <a:xfrm>
+              <a:off x="995221" y="267368"/>
+              <a:ext cx="3028894" cy="3034632"/>
+            </a:xfrm>
+            <a:prstGeom prst="rect">
+              <a:avLst/>
+            </a:prstGeom>
+            <a:gradFill flip="none" rotWithShape="1">
+              <a:gsLst>
+                <a:gs pos="0">
+                  <a:schemeClr val="accent1">
+                    <a:tint val="100000"/>
+                    <a:shade val="100000"/>
+                    <a:satMod val="130000"/>
+                    <a:alpha val="0"/>
+                  </a:schemeClr>
+                </a:gs>
+                <a:gs pos="100000">
+                  <a:schemeClr val="accent1">
+                    <a:tint val="50000"/>
+                    <a:shade val="100000"/>
+                    <a:satMod val="350000"/>
+                    <a:alpha val="0"/>
+                  </a:schemeClr>
+                </a:gs>
+              </a:gsLst>
+              <a:lin ang="16200000" scaled="0"/>
+              <a:tileRect/>
+            </a:gradFill>
+          </p:spPr>
+          <p:style>
+            <a:lnRef idx="1">
+              <a:schemeClr val="accent1"/>
+            </a:lnRef>
+            <a:fillRef idx="3">
+              <a:schemeClr val="accent1"/>
+            </a:fillRef>
+            <a:effectRef idx="2">
+              <a:schemeClr val="accent1"/>
+            </a:effectRef>
+            <a:fontRef idx="minor">
+              <a:schemeClr val="lt1"/>
+            </a:fontRef>
+          </p:style>
+          <p:txBody>
+            <a:bodyPr rtlCol="0" anchor="ctr"/>
+            <a:lstStyle/>
+            <a:p>
+              <a:pPr algn="ctr"/>
+              <a:endParaRPr lang="en-US"/>
+            </a:p>
+          </p:txBody>
+        </p:sp>
+        <p:sp>
+          <p:nvSpPr>
+            <p:cNvPr id="5" name="Oval 4"/>
+            <p:cNvSpPr/>
+            <p:nvPr/>
+          </p:nvSpPr>
+          <p:spPr>
+            <a:xfrm>
+              <a:off x="1203923" y="267368"/>
+              <a:ext cx="935095" cy="373786"/>
+            </a:xfrm>
+            <a:prstGeom prst="ellipse">
+              <a:avLst/>
+            </a:prstGeom>
+          </p:spPr>
+          <p:style>
+            <a:lnRef idx="1">
+              <a:schemeClr val="accent1"/>
+            </a:lnRef>
+            <a:fillRef idx="3">
+              <a:schemeClr val="accent1"/>
+            </a:fillRef>
+            <a:effectRef idx="2">
+              <a:schemeClr val="accent1"/>
+            </a:effectRef>
+            <a:fontRef idx="minor">
+              <a:schemeClr val="lt1"/>
+            </a:fontRef>
+          </p:style>
+          <p:txBody>
+            <a:bodyPr rtlCol="0" anchor="ctr"/>
+            <a:lstStyle/>
+            <a:p>
+              <a:pPr algn="ctr"/>
+              <a:r>
+                <a:rPr lang="en-US" sz="800" dirty="0" smtClean="0"/>
+                <a:t>Sign-up</a:t>
+              </a:r>
+              <a:endParaRPr lang="en-US" sz="800" dirty="0"/>
+            </a:p>
+          </p:txBody>
+        </p:sp>
+        <p:sp>
+          <p:nvSpPr>
+            <p:cNvPr id="6" name="Oval 5"/>
+            <p:cNvSpPr/>
+            <p:nvPr/>
+          </p:nvSpPr>
+          <p:spPr>
+            <a:xfrm>
+              <a:off x="2098362" y="454261"/>
+              <a:ext cx="935095" cy="373786"/>
+            </a:xfrm>
+            <a:prstGeom prst="ellipse">
+              <a:avLst/>
+            </a:prstGeom>
+          </p:spPr>
+          <p:style>
+            <a:lnRef idx="1">
+              <a:schemeClr val="accent1"/>
+            </a:lnRef>
+            <a:fillRef idx="3">
+              <a:schemeClr val="accent1"/>
+            </a:fillRef>
+            <a:effectRef idx="2">
+              <a:schemeClr val="accent1"/>
+            </a:effectRef>
+            <a:fontRef idx="minor">
+              <a:schemeClr val="lt1"/>
+            </a:fontRef>
+          </p:style>
+          <p:txBody>
+            <a:bodyPr rtlCol="0" anchor="ctr"/>
+            <a:lstStyle/>
+            <a:p>
+              <a:pPr algn="ctr"/>
+              <a:r>
+                <a:rPr lang="en-US" sz="800" dirty="0" smtClean="0"/>
+                <a:t>Update Data by System</a:t>
+              </a:r>
+              <a:endParaRPr lang="en-US" sz="800" dirty="0"/>
+            </a:p>
+          </p:txBody>
+        </p:sp>
+        <p:sp>
+          <p:nvSpPr>
+            <p:cNvPr id="7" name="Oval 6"/>
+            <p:cNvSpPr/>
+            <p:nvPr/>
+          </p:nvSpPr>
+          <p:spPr>
+            <a:xfrm>
+              <a:off x="2053639" y="1881615"/>
+              <a:ext cx="935095" cy="373786"/>
+            </a:xfrm>
+            <a:prstGeom prst="ellipse">
+              <a:avLst/>
+            </a:prstGeom>
+          </p:spPr>
+          <p:style>
+            <a:lnRef idx="1">
+              <a:schemeClr val="accent1"/>
+            </a:lnRef>
+            <a:fillRef idx="3">
+              <a:schemeClr val="accent1"/>
+            </a:fillRef>
+            <a:effectRef idx="2">
+              <a:schemeClr val="accent1"/>
+            </a:effectRef>
+            <a:fontRef idx="minor">
+              <a:schemeClr val="lt1"/>
+            </a:fontRef>
+          </p:style>
+          <p:txBody>
+            <a:bodyPr rtlCol="0" anchor="ctr"/>
+            <a:lstStyle/>
+            <a:p>
+              <a:pPr algn="ctr"/>
+              <a:r>
+                <a:rPr lang="en-US" sz="800" dirty="0" smtClean="0"/>
+                <a:t>Remove Account</a:t>
+              </a:r>
+              <a:endParaRPr lang="en-US" sz="800" dirty="0"/>
+            </a:p>
+          </p:txBody>
+        </p:sp>
+        <p:sp>
+          <p:nvSpPr>
+            <p:cNvPr id="8" name="Oval 7"/>
+            <p:cNvSpPr/>
+            <p:nvPr/>
+          </p:nvSpPr>
+          <p:spPr>
+            <a:xfrm>
+              <a:off x="1090085" y="2131861"/>
+              <a:ext cx="935095" cy="373786"/>
+            </a:xfrm>
+            <a:prstGeom prst="ellipse">
+              <a:avLst/>
+            </a:prstGeom>
+          </p:spPr>
+          <p:style>
+            <a:lnRef idx="1">
+              <a:schemeClr val="accent1"/>
+            </a:lnRef>
+            <a:fillRef idx="3">
+              <a:schemeClr val="accent1"/>
+            </a:fillRef>
+            <a:effectRef idx="2">
+              <a:schemeClr val="accent1"/>
+            </a:effectRef>
+            <a:fontRef idx="minor">
+              <a:schemeClr val="lt1"/>
+            </a:fontRef>
+          </p:style>
+          <p:txBody>
+            <a:bodyPr rtlCol="0" anchor="ctr"/>
+            <a:lstStyle/>
+            <a:p>
+              <a:pPr algn="ctr"/>
+              <a:r>
+                <a:rPr lang="en-US" sz="800" dirty="0" smtClean="0"/>
+                <a:t>Notification System</a:t>
+              </a:r>
+              <a:endParaRPr lang="en-US" sz="800" dirty="0"/>
+            </a:p>
+          </p:txBody>
+        </p:sp>
+        <p:sp>
+          <p:nvSpPr>
+            <p:cNvPr id="9" name="Oval 8"/>
+            <p:cNvSpPr/>
+            <p:nvPr/>
+          </p:nvSpPr>
+          <p:spPr>
+            <a:xfrm>
+              <a:off x="1117189" y="714816"/>
+              <a:ext cx="935095" cy="373786"/>
+            </a:xfrm>
+            <a:prstGeom prst="ellipse">
+              <a:avLst/>
+            </a:prstGeom>
+          </p:spPr>
+          <p:style>
+            <a:lnRef idx="1">
+              <a:schemeClr val="accent1"/>
+            </a:lnRef>
+            <a:fillRef idx="3">
+              <a:schemeClr val="accent1"/>
+            </a:fillRef>
+            <a:effectRef idx="2">
+              <a:schemeClr val="accent1"/>
+            </a:effectRef>
+            <a:fontRef idx="minor">
+              <a:schemeClr val="lt1"/>
+            </a:fontRef>
+          </p:style>
+          <p:txBody>
+            <a:bodyPr rtlCol="0" anchor="ctr"/>
+            <a:lstStyle/>
+            <a:p>
+              <a:pPr algn="ctr"/>
+              <a:r>
+                <a:rPr lang="en-US" sz="800" dirty="0" smtClean="0"/>
+                <a:t>Update Data by User</a:t>
+              </a:r>
+              <a:endParaRPr lang="en-US" sz="800" dirty="0"/>
+            </a:p>
+          </p:txBody>
+        </p:sp>
+        <p:sp>
+          <p:nvSpPr>
+            <p:cNvPr id="10" name="Oval 9"/>
+            <p:cNvSpPr/>
+            <p:nvPr/>
+          </p:nvSpPr>
+          <p:spPr>
+            <a:xfrm>
+              <a:off x="2139018" y="954753"/>
+              <a:ext cx="935095" cy="373786"/>
+            </a:xfrm>
+            <a:prstGeom prst="ellipse">
+              <a:avLst/>
+            </a:prstGeom>
+          </p:spPr>
+          <p:style>
+            <a:lnRef idx="1">
+              <a:schemeClr val="accent1"/>
+            </a:lnRef>
+            <a:fillRef idx="3">
+              <a:schemeClr val="accent1"/>
+            </a:fillRef>
+            <a:effectRef idx="2">
+              <a:schemeClr val="accent1"/>
+            </a:effectRef>
+            <a:fontRef idx="minor">
+              <a:schemeClr val="lt1"/>
+            </a:fontRef>
+          </p:style>
+          <p:txBody>
+            <a:bodyPr rtlCol="0" anchor="ctr"/>
+            <a:lstStyle/>
+            <a:p>
+              <a:pPr algn="ctr"/>
+              <a:r>
+                <a:rPr lang="en-US" sz="800" dirty="0" smtClean="0"/>
+                <a:t>Analyze Road Activity</a:t>
+              </a:r>
+              <a:endParaRPr lang="en-US" sz="800" dirty="0"/>
+            </a:p>
+          </p:txBody>
+        </p:sp>
+        <p:sp>
+          <p:nvSpPr>
+            <p:cNvPr id="11" name="Oval 10"/>
+            <p:cNvSpPr/>
+            <p:nvPr/>
+          </p:nvSpPr>
+          <p:spPr>
+            <a:xfrm>
+              <a:off x="1083309" y="1201199"/>
+              <a:ext cx="935095" cy="373786"/>
+            </a:xfrm>
+            <a:prstGeom prst="ellipse">
+              <a:avLst/>
+            </a:prstGeom>
+          </p:spPr>
+          <p:style>
+            <a:lnRef idx="1">
+              <a:schemeClr val="accent1"/>
+            </a:lnRef>
+            <a:fillRef idx="3">
+              <a:schemeClr val="accent1"/>
+            </a:fillRef>
+            <a:effectRef idx="2">
+              <a:schemeClr val="accent1"/>
+            </a:effectRef>
+            <a:fontRef idx="minor">
+              <a:schemeClr val="lt1"/>
+            </a:fontRef>
+          </p:style>
+          <p:txBody>
+            <a:bodyPr rtlCol="0" anchor="ctr"/>
+            <a:lstStyle/>
+            <a:p>
+              <a:pPr algn="ctr"/>
+              <a:r>
+                <a:rPr lang="en-US" sz="800" dirty="0" smtClean="0"/>
+                <a:t>Enter Roads Travelled</a:t>
+              </a:r>
+              <a:endParaRPr lang="en-US" sz="800" dirty="0"/>
+            </a:p>
+          </p:txBody>
+        </p:sp>
+        <p:sp>
+          <p:nvSpPr>
+            <p:cNvPr id="12" name="Oval 11"/>
+            <p:cNvSpPr/>
+            <p:nvPr/>
+          </p:nvSpPr>
+          <p:spPr>
+            <a:xfrm>
+              <a:off x="2098362" y="1443842"/>
+              <a:ext cx="935095" cy="373786"/>
+            </a:xfrm>
+            <a:prstGeom prst="ellipse">
+              <a:avLst/>
+            </a:prstGeom>
+          </p:spPr>
+          <p:style>
+            <a:lnRef idx="1">
+              <a:schemeClr val="accent1"/>
+            </a:lnRef>
+            <a:fillRef idx="3">
+              <a:schemeClr val="accent1"/>
+            </a:fillRef>
+            <a:effectRef idx="2">
+              <a:schemeClr val="accent1"/>
+            </a:effectRef>
+            <a:fontRef idx="minor">
+              <a:schemeClr val="lt1"/>
+            </a:fontRef>
+          </p:style>
+          <p:txBody>
+            <a:bodyPr rtlCol="0" anchor="ctr"/>
+            <a:lstStyle/>
+            <a:p>
+              <a:pPr algn="ctr"/>
+              <a:r>
+                <a:rPr lang="en-US" sz="800" dirty="0" smtClean="0"/>
+                <a:t>Edit Account </a:t>
+              </a:r>
+              <a:r>
+                <a:rPr lang="en-US" sz="800" dirty="0" smtClean="0"/>
+                <a:t>Settings</a:t>
+              </a:r>
+              <a:endParaRPr lang="en-US" sz="800" dirty="0"/>
+            </a:p>
+          </p:txBody>
+        </p:sp>
+        <p:sp>
+          <p:nvSpPr>
+            <p:cNvPr id="13" name="Oval 12"/>
+            <p:cNvSpPr/>
+            <p:nvPr/>
+          </p:nvSpPr>
+          <p:spPr>
+            <a:xfrm>
+              <a:off x="2052284" y="2318755"/>
+              <a:ext cx="935095" cy="560678"/>
+            </a:xfrm>
+            <a:prstGeom prst="ellipse">
+              <a:avLst/>
+            </a:prstGeom>
+          </p:spPr>
+          <p:style>
+            <a:lnRef idx="1">
+              <a:schemeClr val="accent1"/>
+            </a:lnRef>
+            <a:fillRef idx="3">
+              <a:schemeClr val="accent1"/>
+            </a:fillRef>
+            <a:effectRef idx="2">
+              <a:schemeClr val="accent1"/>
+            </a:effectRef>
+            <a:fontRef idx="minor">
+              <a:schemeClr val="lt1"/>
+            </a:fontRef>
+          </p:style>
+          <p:txBody>
+            <a:bodyPr rtlCol="0" anchor="ctr"/>
+            <a:lstStyle/>
+            <a:p>
+              <a:pPr algn="ctr"/>
+              <a:r>
+                <a:rPr lang="en-US" sz="800" dirty="0" smtClean="0"/>
+                <a:t>Current Road Activities</a:t>
+              </a:r>
+              <a:endParaRPr lang="en-US" sz="800" dirty="0"/>
+            </a:p>
+          </p:txBody>
+        </p:sp>
+        <p:sp>
+          <p:nvSpPr>
+            <p:cNvPr id="14" name="Oval 13"/>
+            <p:cNvSpPr/>
+            <p:nvPr/>
+          </p:nvSpPr>
+          <p:spPr>
+            <a:xfrm>
+              <a:off x="1118545" y="2692540"/>
+              <a:ext cx="935095" cy="373786"/>
+            </a:xfrm>
+            <a:prstGeom prst="ellipse">
+              <a:avLst/>
+            </a:prstGeom>
+          </p:spPr>
+          <p:style>
+            <a:lnRef idx="1">
+              <a:schemeClr val="accent1"/>
+            </a:lnRef>
+            <a:fillRef idx="3">
+              <a:schemeClr val="accent1"/>
+            </a:fillRef>
+            <a:effectRef idx="2">
+              <a:schemeClr val="accent1"/>
+            </a:effectRef>
+            <a:fontRef idx="minor">
+              <a:schemeClr val="lt1"/>
+            </a:fontRef>
+          </p:style>
+          <p:txBody>
+            <a:bodyPr rtlCol="0" anchor="ctr"/>
+            <a:lstStyle/>
+            <a:p>
+              <a:pPr algn="ctr"/>
+              <a:r>
+                <a:rPr lang="en-US" sz="800" dirty="0" smtClean="0"/>
+                <a:t>Sign In</a:t>
+              </a:r>
+              <a:endParaRPr lang="en-US" sz="800" dirty="0"/>
+            </a:p>
+          </p:txBody>
+        </p:sp>
+        <p:sp>
+          <p:nvSpPr>
+            <p:cNvPr id="15" name="Oval 14"/>
+            <p:cNvSpPr/>
+            <p:nvPr/>
+          </p:nvSpPr>
+          <p:spPr>
+            <a:xfrm>
+              <a:off x="2098362" y="2928214"/>
+              <a:ext cx="935095" cy="373786"/>
+            </a:xfrm>
+            <a:prstGeom prst="ellipse">
+              <a:avLst/>
+            </a:prstGeom>
+          </p:spPr>
+          <p:style>
+            <a:lnRef idx="1">
+              <a:schemeClr val="accent1"/>
+            </a:lnRef>
+            <a:fillRef idx="3">
+              <a:schemeClr val="accent1"/>
+            </a:fillRef>
+            <a:effectRef idx="2">
+              <a:schemeClr val="accent1"/>
+            </a:effectRef>
+            <a:fontRef idx="minor">
+              <a:schemeClr val="lt1"/>
+            </a:fontRef>
+          </p:style>
+          <p:txBody>
+            <a:bodyPr rtlCol="0" anchor="ctr"/>
+            <a:lstStyle/>
+            <a:p>
+              <a:pPr algn="ctr"/>
+              <a:r>
+                <a:rPr lang="en-US" sz="800" dirty="0" smtClean="0"/>
+                <a:t>Sign Out</a:t>
+              </a:r>
+              <a:endParaRPr lang="en-US" sz="800" dirty="0"/>
+            </a:p>
+          </p:txBody>
+        </p:sp>
+        <p:grpSp>
+          <p:nvGrpSpPr>
+            <p:cNvPr id="16" name="Group 15"/>
+            <p:cNvGrpSpPr/>
+            <p:nvPr/>
+          </p:nvGrpSpPr>
+          <p:grpSpPr>
+            <a:xfrm>
+              <a:off x="286162" y="1437718"/>
+              <a:ext cx="250714" cy="487822"/>
+              <a:chOff x="962523" y="935789"/>
+              <a:chExt cx="494632" cy="1029369"/>
+            </a:xfrm>
+          </p:grpSpPr>
+          <p:sp>
+            <p:nvSpPr>
+              <p:cNvPr id="17" name="Oval 16"/>
+              <p:cNvSpPr/>
+              <p:nvPr/>
+            </p:nvSpPr>
+            <p:spPr>
+              <a:xfrm>
+                <a:off x="1069474" y="935789"/>
+                <a:ext cx="294105" cy="387685"/>
+              </a:xfrm>
+              <a:prstGeom prst="ellipse">
+                <a:avLst/>
+              </a:prstGeom>
+            </p:spPr>
+            <p:style>
+              <a:lnRef idx="1">
+                <a:schemeClr val="accent1"/>
+              </a:lnRef>
+              <a:fillRef idx="3">
+                <a:schemeClr val="accent1"/>
+              </a:fillRef>
+              <a:effectRef idx="2">
+                <a:schemeClr val="accent1"/>
+              </a:effectRef>
+              <a:fontRef idx="minor">
+                <a:schemeClr val="lt1"/>
+              </a:fontRef>
+            </p:style>
+            <p:txBody>
+              <a:bodyPr rtlCol="0" anchor="ctr"/>
+              <a:lstStyle/>
+              <a:p>
+                <a:pPr algn="ctr"/>
+                <a:endParaRPr lang="en-US"/>
+              </a:p>
+            </p:txBody>
+          </p:sp>
+          <p:cxnSp>
+            <p:nvCxnSpPr>
+              <p:cNvPr id="18" name="Straight Connector 17"/>
+              <p:cNvCxnSpPr>
+                <a:stCxn id="17" idx="4"/>
+              </p:cNvCxnSpPr>
+              <p:nvPr/>
+            </p:nvCxnSpPr>
+            <p:spPr>
+              <a:xfrm>
+                <a:off x="1216527" y="1323474"/>
+                <a:ext cx="0" cy="394368"/>
+              </a:xfrm>
+              <a:prstGeom prst="line">
+                <a:avLst/>
+              </a:prstGeom>
+            </p:spPr>
+            <p:style>
+              <a:lnRef idx="2">
+                <a:schemeClr val="accent1"/>
+              </a:lnRef>
+              <a:fillRef idx="0">
+                <a:schemeClr val="accent1"/>
+              </a:fillRef>
+              <a:effectRef idx="1">
+                <a:schemeClr val="accent1"/>
+              </a:effectRef>
+              <a:fontRef idx="minor">
+                <a:schemeClr val="tx1"/>
+              </a:fontRef>
+            </p:style>
+          </p:cxnSp>
+          <p:cxnSp>
+            <p:nvCxnSpPr>
+              <p:cNvPr id="19" name="Straight Connector 18"/>
+              <p:cNvCxnSpPr/>
+              <p:nvPr/>
+            </p:nvCxnSpPr>
+            <p:spPr>
+              <a:xfrm flipH="1">
+                <a:off x="1069474" y="1717842"/>
+                <a:ext cx="147053" cy="247316"/>
+              </a:xfrm>
+              <a:prstGeom prst="line">
+                <a:avLst/>
+              </a:prstGeom>
+            </p:spPr>
+            <p:style>
+              <a:lnRef idx="2">
+                <a:schemeClr val="accent1"/>
+              </a:lnRef>
+              <a:fillRef idx="0">
+                <a:schemeClr val="accent1"/>
+              </a:fillRef>
+              <a:effectRef idx="1">
+                <a:schemeClr val="accent1"/>
+              </a:effectRef>
+              <a:fontRef idx="minor">
+                <a:schemeClr val="tx1"/>
+              </a:fontRef>
+            </p:style>
+          </p:cxnSp>
+          <p:cxnSp>
+            <p:nvCxnSpPr>
+              <p:cNvPr id="20" name="Straight Connector 19"/>
+              <p:cNvCxnSpPr/>
+              <p:nvPr/>
+            </p:nvCxnSpPr>
+            <p:spPr>
+              <a:xfrm>
+                <a:off x="1216527" y="1717842"/>
+                <a:ext cx="147052" cy="247316"/>
+              </a:xfrm>
+              <a:prstGeom prst="line">
+                <a:avLst/>
+              </a:prstGeom>
+            </p:spPr>
+            <p:style>
+              <a:lnRef idx="2">
+                <a:schemeClr val="accent1"/>
+              </a:lnRef>
+              <a:fillRef idx="0">
+                <a:schemeClr val="accent1"/>
+              </a:fillRef>
+              <a:effectRef idx="1">
+                <a:schemeClr val="accent1"/>
+              </a:effectRef>
+              <a:fontRef idx="minor">
+                <a:schemeClr val="tx1"/>
+              </a:fontRef>
+            </p:style>
+          </p:cxnSp>
+          <p:cxnSp>
+            <p:nvCxnSpPr>
+              <p:cNvPr id="21" name="Straight Connector 20"/>
+              <p:cNvCxnSpPr/>
+              <p:nvPr/>
+            </p:nvCxnSpPr>
+            <p:spPr>
+              <a:xfrm>
+                <a:off x="962523" y="1477209"/>
+                <a:ext cx="494632" cy="0"/>
+              </a:xfrm>
+              <a:prstGeom prst="line">
+                <a:avLst/>
+              </a:prstGeom>
+            </p:spPr>
+            <p:style>
+              <a:lnRef idx="2">
+                <a:schemeClr val="accent1"/>
+              </a:lnRef>
+              <a:fillRef idx="0">
+                <a:schemeClr val="accent1"/>
+              </a:fillRef>
+              <a:effectRef idx="1">
+                <a:schemeClr val="accent1"/>
+              </a:effectRef>
+              <a:fontRef idx="minor">
+                <a:schemeClr val="tx1"/>
+              </a:fontRef>
+            </p:style>
+          </p:cxnSp>
+        </p:grpSp>
+        <p:grpSp>
+          <p:nvGrpSpPr>
+            <p:cNvPr id="22" name="Group 21"/>
+            <p:cNvGrpSpPr/>
+            <p:nvPr/>
+          </p:nvGrpSpPr>
+          <p:grpSpPr>
+            <a:xfrm>
+              <a:off x="286162" y="451898"/>
+              <a:ext cx="250714" cy="487822"/>
+              <a:chOff x="962523" y="935789"/>
+              <a:chExt cx="494632" cy="1029369"/>
+            </a:xfrm>
+          </p:grpSpPr>
+          <p:sp>
+            <p:nvSpPr>
+              <p:cNvPr id="23" name="Oval 22"/>
+              <p:cNvSpPr/>
+              <p:nvPr/>
+            </p:nvSpPr>
+            <p:spPr>
+              <a:xfrm>
+                <a:off x="1069474" y="935789"/>
+                <a:ext cx="294105" cy="387685"/>
+              </a:xfrm>
+              <a:prstGeom prst="ellipse">
+                <a:avLst/>
+              </a:prstGeom>
+            </p:spPr>
+            <p:style>
+              <a:lnRef idx="1">
+                <a:schemeClr val="accent1"/>
+              </a:lnRef>
+              <a:fillRef idx="3">
+                <a:schemeClr val="accent1"/>
+              </a:fillRef>
+              <a:effectRef idx="2">
+                <a:schemeClr val="accent1"/>
+              </a:effectRef>
+              <a:fontRef idx="minor">
+                <a:schemeClr val="lt1"/>
+              </a:fontRef>
+            </p:style>
+            <p:txBody>
+              <a:bodyPr rtlCol="0" anchor="ctr"/>
+              <a:lstStyle/>
+              <a:p>
+                <a:pPr algn="ctr"/>
+                <a:endParaRPr lang="en-US"/>
+              </a:p>
+            </p:txBody>
+          </p:sp>
+          <p:cxnSp>
+            <p:nvCxnSpPr>
+              <p:cNvPr id="24" name="Straight Connector 23"/>
+              <p:cNvCxnSpPr>
+                <a:stCxn id="23" idx="4"/>
+              </p:cNvCxnSpPr>
+              <p:nvPr/>
+            </p:nvCxnSpPr>
+            <p:spPr>
+              <a:xfrm>
+                <a:off x="1216527" y="1323474"/>
+                <a:ext cx="0" cy="394368"/>
+              </a:xfrm>
+              <a:prstGeom prst="line">
+                <a:avLst/>
+              </a:prstGeom>
+            </p:spPr>
+            <p:style>
+              <a:lnRef idx="2">
+                <a:schemeClr val="accent1"/>
+              </a:lnRef>
+              <a:fillRef idx="0">
+                <a:schemeClr val="accent1"/>
+              </a:fillRef>
+              <a:effectRef idx="1">
+                <a:schemeClr val="accent1"/>
+              </a:effectRef>
+              <a:fontRef idx="minor">
+                <a:schemeClr val="tx1"/>
+              </a:fontRef>
+            </p:style>
+          </p:cxnSp>
+          <p:cxnSp>
+            <p:nvCxnSpPr>
+              <p:cNvPr id="25" name="Straight Connector 24"/>
+              <p:cNvCxnSpPr/>
+              <p:nvPr/>
+            </p:nvCxnSpPr>
+            <p:spPr>
+              <a:xfrm flipH="1">
+                <a:off x="1069474" y="1717842"/>
+                <a:ext cx="147053" cy="247316"/>
+              </a:xfrm>
+              <a:prstGeom prst="line">
+                <a:avLst/>
+              </a:prstGeom>
+            </p:spPr>
+            <p:style>
+              <a:lnRef idx="2">
+                <a:schemeClr val="accent1"/>
+              </a:lnRef>
+              <a:fillRef idx="0">
+                <a:schemeClr val="accent1"/>
+              </a:fillRef>
+              <a:effectRef idx="1">
+                <a:schemeClr val="accent1"/>
+              </a:effectRef>
+              <a:fontRef idx="minor">
+                <a:schemeClr val="tx1"/>
+              </a:fontRef>
+            </p:style>
+          </p:cxnSp>
+          <p:cxnSp>
+            <p:nvCxnSpPr>
+              <p:cNvPr id="26" name="Straight Connector 25"/>
+              <p:cNvCxnSpPr/>
+              <p:nvPr/>
+            </p:nvCxnSpPr>
+            <p:spPr>
+              <a:xfrm>
+                <a:off x="1216527" y="1717842"/>
+                <a:ext cx="147052" cy="247316"/>
+              </a:xfrm>
+              <a:prstGeom prst="line">
+                <a:avLst/>
+              </a:prstGeom>
+            </p:spPr>
+            <p:style>
+              <a:lnRef idx="2">
+                <a:schemeClr val="accent1"/>
+              </a:lnRef>
+              <a:fillRef idx="0">
+                <a:schemeClr val="accent1"/>
+              </a:fillRef>
+              <a:effectRef idx="1">
+                <a:schemeClr val="accent1"/>
+              </a:effectRef>
+              <a:fontRef idx="minor">
+                <a:schemeClr val="tx1"/>
+              </a:fontRef>
+            </p:style>
+          </p:cxnSp>
+          <p:cxnSp>
+            <p:nvCxnSpPr>
+              <p:cNvPr id="27" name="Straight Connector 26"/>
+              <p:cNvCxnSpPr/>
+              <p:nvPr/>
+            </p:nvCxnSpPr>
+            <p:spPr>
+              <a:xfrm>
+                <a:off x="962523" y="1477209"/>
+                <a:ext cx="494632" cy="0"/>
+              </a:xfrm>
+              <a:prstGeom prst="line">
+                <a:avLst/>
+              </a:prstGeom>
+            </p:spPr>
+            <p:style>
+              <a:lnRef idx="2">
+                <a:schemeClr val="accent1"/>
+              </a:lnRef>
+              <a:fillRef idx="0">
+                <a:schemeClr val="accent1"/>
+              </a:fillRef>
+              <a:effectRef idx="1">
+                <a:schemeClr val="accent1"/>
+              </a:effectRef>
+              <a:fontRef idx="minor">
+                <a:schemeClr val="tx1"/>
+              </a:fontRef>
+            </p:style>
+          </p:cxnSp>
+        </p:grpSp>
+        <p:grpSp>
+          <p:nvGrpSpPr>
+            <p:cNvPr id="28" name="Group 27"/>
+            <p:cNvGrpSpPr/>
+            <p:nvPr/>
+          </p:nvGrpSpPr>
+          <p:grpSpPr>
+            <a:xfrm>
+              <a:off x="168245" y="2551621"/>
+              <a:ext cx="250714" cy="487822"/>
+              <a:chOff x="962523" y="935789"/>
+              <a:chExt cx="494632" cy="1029369"/>
+            </a:xfrm>
+          </p:grpSpPr>
+          <p:sp>
+            <p:nvSpPr>
+              <p:cNvPr id="29" name="Oval 28"/>
+              <p:cNvSpPr/>
+              <p:nvPr/>
+            </p:nvSpPr>
+            <p:spPr>
+              <a:xfrm>
+                <a:off x="1069474" y="935789"/>
+                <a:ext cx="294105" cy="387685"/>
+              </a:xfrm>
+              <a:prstGeom prst="ellipse">
+                <a:avLst/>
+              </a:prstGeom>
+            </p:spPr>
+            <p:style>
+              <a:lnRef idx="1">
+                <a:schemeClr val="accent1"/>
+              </a:lnRef>
+              <a:fillRef idx="3">
+                <a:schemeClr val="accent1"/>
+              </a:fillRef>
+              <a:effectRef idx="2">
+                <a:schemeClr val="accent1"/>
+              </a:effectRef>
+              <a:fontRef idx="minor">
+                <a:schemeClr val="lt1"/>
+              </a:fontRef>
+            </p:style>
+            <p:txBody>
+              <a:bodyPr rtlCol="0" anchor="ctr"/>
+              <a:lstStyle/>
+              <a:p>
+                <a:pPr algn="ctr"/>
+                <a:endParaRPr lang="en-US"/>
+              </a:p>
+            </p:txBody>
+          </p:sp>
+          <p:cxnSp>
+            <p:nvCxnSpPr>
+              <p:cNvPr id="30" name="Straight Connector 29"/>
+              <p:cNvCxnSpPr>
+                <a:stCxn id="29" idx="4"/>
+              </p:cNvCxnSpPr>
+              <p:nvPr/>
+            </p:nvCxnSpPr>
+            <p:spPr>
+              <a:xfrm>
+                <a:off x="1216527" y="1323474"/>
+                <a:ext cx="0" cy="394368"/>
+              </a:xfrm>
+              <a:prstGeom prst="line">
+                <a:avLst/>
+              </a:prstGeom>
+            </p:spPr>
+            <p:style>
+              <a:lnRef idx="2">
+                <a:schemeClr val="accent1"/>
+              </a:lnRef>
+              <a:fillRef idx="0">
+                <a:schemeClr val="accent1"/>
+              </a:fillRef>
+              <a:effectRef idx="1">
+                <a:schemeClr val="accent1"/>
+              </a:effectRef>
+              <a:fontRef idx="minor">
+                <a:schemeClr val="tx1"/>
+              </a:fontRef>
+            </p:style>
+          </p:cxnSp>
+          <p:cxnSp>
+            <p:nvCxnSpPr>
+              <p:cNvPr id="31" name="Straight Connector 30"/>
+              <p:cNvCxnSpPr/>
+              <p:nvPr/>
+            </p:nvCxnSpPr>
+            <p:spPr>
+              <a:xfrm flipH="1">
+                <a:off x="1069474" y="1717842"/>
+                <a:ext cx="147053" cy="247316"/>
+              </a:xfrm>
+              <a:prstGeom prst="line">
+                <a:avLst/>
+              </a:prstGeom>
+            </p:spPr>
+            <p:style>
+              <a:lnRef idx="2">
+                <a:schemeClr val="accent1"/>
+              </a:lnRef>
+              <a:fillRef idx="0">
+                <a:schemeClr val="accent1"/>
+              </a:fillRef>
+              <a:effectRef idx="1">
+                <a:schemeClr val="accent1"/>
+              </a:effectRef>
+              <a:fontRef idx="minor">
+                <a:schemeClr val="tx1"/>
+              </a:fontRef>
+            </p:style>
+          </p:cxnSp>
+          <p:cxnSp>
+            <p:nvCxnSpPr>
+              <p:cNvPr id="32" name="Straight Connector 31"/>
+              <p:cNvCxnSpPr/>
+              <p:nvPr/>
+            </p:nvCxnSpPr>
+            <p:spPr>
+              <a:xfrm>
+                <a:off x="1216527" y="1717842"/>
+                <a:ext cx="147052" cy="247316"/>
+              </a:xfrm>
+              <a:prstGeom prst="line">
+                <a:avLst/>
+              </a:prstGeom>
+            </p:spPr>
+            <p:style>
+              <a:lnRef idx="2">
+                <a:schemeClr val="accent1"/>
+              </a:lnRef>
+              <a:fillRef idx="0">
+                <a:schemeClr val="accent1"/>
+              </a:fillRef>
+              <a:effectRef idx="1">
+                <a:schemeClr val="accent1"/>
+              </a:effectRef>
+              <a:fontRef idx="minor">
+                <a:schemeClr val="tx1"/>
+              </a:fontRef>
+            </p:style>
+          </p:cxnSp>
+          <p:cxnSp>
+            <p:nvCxnSpPr>
+              <p:cNvPr id="33" name="Straight Connector 32"/>
+              <p:cNvCxnSpPr/>
+              <p:nvPr/>
+            </p:nvCxnSpPr>
+            <p:spPr>
+              <a:xfrm>
+                <a:off x="962523" y="1477209"/>
+                <a:ext cx="494632" cy="0"/>
+              </a:xfrm>
+              <a:prstGeom prst="line">
+                <a:avLst/>
+              </a:prstGeom>
+            </p:spPr>
+            <p:style>
+              <a:lnRef idx="2">
+                <a:schemeClr val="accent1"/>
+              </a:lnRef>
+              <a:fillRef idx="0">
+                <a:schemeClr val="accent1"/>
+              </a:fillRef>
+              <a:effectRef idx="1">
+                <a:schemeClr val="accent1"/>
+              </a:effectRef>
+              <a:fontRef idx="minor">
+                <a:schemeClr val="tx1"/>
+              </a:fontRef>
+            </p:style>
+          </p:cxnSp>
+        </p:grpSp>
+        <p:sp>
+          <p:nvSpPr>
+            <p:cNvPr id="34" name="TextBox 33"/>
+            <p:cNvSpPr txBox="1"/>
+            <p:nvPr/>
+          </p:nvSpPr>
+          <p:spPr>
+            <a:xfrm>
+              <a:off x="31912" y="967423"/>
+              <a:ext cx="379607" cy="175028"/>
+            </a:xfrm>
+            <a:prstGeom prst="rect">
+              <a:avLst/>
+            </a:prstGeom>
+            <a:noFill/>
+          </p:spPr>
+          <p:txBody>
+            <a:bodyPr wrap="none" rtlCol="0">
+              <a:spAutoFit/>
+            </a:bodyPr>
+            <a:lstStyle/>
+            <a:p>
+              <a:r>
+                <a:rPr lang="en-US" dirty="0" smtClean="0">
+                  <a:solidFill>
+                    <a:schemeClr val="tx2">
+                      <a:lumMod val="60000"/>
+                      <a:lumOff val="40000"/>
+                    </a:schemeClr>
+                  </a:solidFill>
+                </a:rPr>
+                <a:t>ODOT</a:t>
+              </a:r>
+              <a:endParaRPr lang="en-US" dirty="0">
+                <a:solidFill>
+                  <a:schemeClr val="tx2">
+                    <a:lumMod val="60000"/>
+                    <a:lumOff val="40000"/>
+                  </a:schemeClr>
+                </a:solidFill>
+              </a:endParaRPr>
+            </a:p>
+          </p:txBody>
+        </p:sp>
+        <p:sp>
+          <p:nvSpPr>
+            <p:cNvPr id="35" name="TextBox 34"/>
+            <p:cNvSpPr txBox="1"/>
+            <p:nvPr/>
+          </p:nvSpPr>
+          <p:spPr>
+            <a:xfrm>
+              <a:off x="22080" y="1899191"/>
+              <a:ext cx="314606" cy="175028"/>
+            </a:xfrm>
+            <a:prstGeom prst="rect">
+              <a:avLst/>
+            </a:prstGeom>
+            <a:noFill/>
+          </p:spPr>
+          <p:txBody>
+            <a:bodyPr wrap="none" rtlCol="0">
+              <a:spAutoFit/>
+            </a:bodyPr>
+            <a:lstStyle/>
+            <a:p>
+              <a:r>
+                <a:rPr lang="en-US" dirty="0" smtClean="0">
+                  <a:solidFill>
+                    <a:schemeClr val="tx2">
+                      <a:lumMod val="60000"/>
+                      <a:lumOff val="40000"/>
+                    </a:schemeClr>
+                  </a:solidFill>
+                </a:rPr>
+                <a:t>User</a:t>
+              </a:r>
+              <a:endParaRPr lang="en-US" dirty="0">
+                <a:solidFill>
+                  <a:schemeClr val="tx2">
+                    <a:lumMod val="60000"/>
+                    <a:lumOff val="40000"/>
+                  </a:schemeClr>
+                </a:solidFill>
+              </a:endParaRPr>
+            </a:p>
+          </p:txBody>
+        </p:sp>
+        <p:sp>
+          <p:nvSpPr>
+            <p:cNvPr id="36" name="TextBox 35"/>
+            <p:cNvSpPr txBox="1"/>
+            <p:nvPr/>
+          </p:nvSpPr>
+          <p:spPr>
+            <a:xfrm>
+              <a:off x="64412" y="3066325"/>
+              <a:ext cx="436952" cy="175028"/>
+            </a:xfrm>
+            <a:prstGeom prst="rect">
+              <a:avLst/>
+            </a:prstGeom>
+            <a:noFill/>
+          </p:spPr>
+          <p:txBody>
+            <a:bodyPr wrap="none" rtlCol="0">
+              <a:spAutoFit/>
+            </a:bodyPr>
+            <a:lstStyle/>
+            <a:p>
+              <a:r>
+                <a:rPr lang="en-US" dirty="0" smtClean="0">
+                  <a:solidFill>
+                    <a:schemeClr val="tx2">
+                      <a:lumMod val="60000"/>
+                      <a:lumOff val="40000"/>
+                    </a:schemeClr>
+                  </a:solidFill>
+                </a:rPr>
+                <a:t>System</a:t>
+              </a:r>
+              <a:endParaRPr lang="en-US" dirty="0">
+                <a:solidFill>
+                  <a:schemeClr val="tx2">
+                    <a:lumMod val="60000"/>
+                    <a:lumOff val="40000"/>
+                  </a:schemeClr>
+                </a:solidFill>
+              </a:endParaRPr>
+            </a:p>
+          </p:txBody>
+        </p:sp>
+        <p:cxnSp>
+          <p:nvCxnSpPr>
+            <p:cNvPr id="37" name="Straight Connector 36"/>
+            <p:cNvCxnSpPr>
+              <a:stCxn id="5" idx="2"/>
+            </p:cNvCxnSpPr>
+            <p:nvPr/>
+          </p:nvCxnSpPr>
+          <p:spPr>
+            <a:xfrm flipH="1">
+              <a:off x="590114" y="454261"/>
+              <a:ext cx="613808" cy="1246162"/>
+            </a:xfrm>
+            <a:prstGeom prst="line">
+              <a:avLst/>
+            </a:prstGeom>
+          </p:spPr>
+          <p:style>
+            <a:lnRef idx="2">
+              <a:schemeClr val="accent1"/>
+            </a:lnRef>
+            <a:fillRef idx="0">
+              <a:schemeClr val="accent1"/>
+            </a:fillRef>
+            <a:effectRef idx="1">
+              <a:schemeClr val="accent1"/>
+            </a:effectRef>
+            <a:fontRef idx="minor">
+              <a:schemeClr val="tx1"/>
+            </a:fontRef>
+          </p:style>
+        </p:cxnSp>
+        <p:cxnSp>
+          <p:nvCxnSpPr>
+            <p:cNvPr id="38" name="Straight Connector 37"/>
+            <p:cNvCxnSpPr>
+              <a:stCxn id="9" idx="2"/>
+            </p:cNvCxnSpPr>
+            <p:nvPr/>
+          </p:nvCxnSpPr>
+          <p:spPr>
+            <a:xfrm flipH="1">
+              <a:off x="590114" y="901709"/>
+              <a:ext cx="527075" cy="798714"/>
+            </a:xfrm>
+            <a:prstGeom prst="line">
+              <a:avLst/>
+            </a:prstGeom>
+          </p:spPr>
+          <p:style>
+            <a:lnRef idx="2">
+              <a:schemeClr val="accent1"/>
+            </a:lnRef>
+            <a:fillRef idx="0">
+              <a:schemeClr val="accent1"/>
+            </a:fillRef>
+            <a:effectRef idx="1">
+              <a:schemeClr val="accent1"/>
+            </a:effectRef>
+            <a:fontRef idx="minor">
+              <a:schemeClr val="tx1"/>
+            </a:fontRef>
+          </p:style>
+        </p:cxnSp>
+        <p:cxnSp>
+          <p:nvCxnSpPr>
+            <p:cNvPr id="39" name="Straight Connector 38"/>
+            <p:cNvCxnSpPr>
+              <a:stCxn id="11" idx="2"/>
+            </p:cNvCxnSpPr>
+            <p:nvPr/>
+          </p:nvCxnSpPr>
+          <p:spPr>
+            <a:xfrm flipH="1">
+              <a:off x="590114" y="1388092"/>
+              <a:ext cx="493195" cy="312332"/>
+            </a:xfrm>
+            <a:prstGeom prst="line">
+              <a:avLst/>
+            </a:prstGeom>
+          </p:spPr>
+          <p:style>
+            <a:lnRef idx="2">
+              <a:schemeClr val="accent1"/>
+            </a:lnRef>
+            <a:fillRef idx="0">
+              <a:schemeClr val="accent1"/>
+            </a:fillRef>
+            <a:effectRef idx="1">
+              <a:schemeClr val="accent1"/>
+            </a:effectRef>
+            <a:fontRef idx="minor">
+              <a:schemeClr val="tx1"/>
+            </a:fontRef>
+          </p:style>
+        </p:cxnSp>
+        <p:cxnSp>
+          <p:nvCxnSpPr>
+            <p:cNvPr id="40" name="Straight Connector 39"/>
+            <p:cNvCxnSpPr/>
+            <p:nvPr/>
+          </p:nvCxnSpPr>
+          <p:spPr>
+            <a:xfrm flipH="1" flipV="1">
+              <a:off x="590114" y="1700423"/>
+              <a:ext cx="528430" cy="150149"/>
+            </a:xfrm>
+            <a:prstGeom prst="line">
+              <a:avLst/>
+            </a:prstGeom>
+          </p:spPr>
+          <p:style>
+            <a:lnRef idx="2">
+              <a:schemeClr val="accent1"/>
+            </a:lnRef>
+            <a:fillRef idx="0">
+              <a:schemeClr val="accent1"/>
+            </a:fillRef>
+            <a:effectRef idx="1">
+              <a:schemeClr val="accent1"/>
+            </a:effectRef>
+            <a:fontRef idx="minor">
+              <a:schemeClr val="tx1"/>
+            </a:fontRef>
+          </p:style>
+        </p:cxnSp>
+        <p:cxnSp>
+          <p:nvCxnSpPr>
+            <p:cNvPr id="41" name="Straight Connector 40"/>
+            <p:cNvCxnSpPr>
+              <a:stCxn id="8" idx="2"/>
+            </p:cNvCxnSpPr>
+            <p:nvPr/>
+          </p:nvCxnSpPr>
+          <p:spPr>
+            <a:xfrm flipH="1">
+              <a:off x="493805" y="2318754"/>
+              <a:ext cx="596280" cy="437139"/>
+            </a:xfrm>
+            <a:prstGeom prst="line">
+              <a:avLst/>
+            </a:prstGeom>
+          </p:spPr>
+          <p:style>
+            <a:lnRef idx="2">
+              <a:schemeClr val="accent1"/>
+            </a:lnRef>
+            <a:fillRef idx="0">
+              <a:schemeClr val="accent1"/>
+            </a:fillRef>
+            <a:effectRef idx="1">
+              <a:schemeClr val="accent1"/>
+            </a:effectRef>
+            <a:fontRef idx="minor">
+              <a:schemeClr val="tx1"/>
+            </a:fontRef>
+          </p:style>
+        </p:cxnSp>
+        <p:cxnSp>
+          <p:nvCxnSpPr>
+            <p:cNvPr id="42" name="Straight Connector 41"/>
+            <p:cNvCxnSpPr>
+              <a:stCxn id="10" idx="2"/>
+            </p:cNvCxnSpPr>
+            <p:nvPr/>
+          </p:nvCxnSpPr>
+          <p:spPr>
+            <a:xfrm flipH="1">
+              <a:off x="1083309" y="1141646"/>
+              <a:ext cx="1055708" cy="59552"/>
+            </a:xfrm>
+            <a:prstGeom prst="line">
+              <a:avLst/>
+            </a:prstGeom>
+          </p:spPr>
+          <p:style>
+            <a:lnRef idx="2">
+              <a:schemeClr val="accent1"/>
+            </a:lnRef>
+            <a:fillRef idx="0">
+              <a:schemeClr val="accent1"/>
+            </a:fillRef>
+            <a:effectRef idx="1">
+              <a:schemeClr val="accent1"/>
+            </a:effectRef>
+            <a:fontRef idx="minor">
+              <a:schemeClr val="tx1"/>
+            </a:fontRef>
+          </p:style>
+        </p:cxnSp>
+        <p:cxnSp>
+          <p:nvCxnSpPr>
+            <p:cNvPr id="43" name="Straight Connector 42"/>
+            <p:cNvCxnSpPr/>
+            <p:nvPr/>
+          </p:nvCxnSpPr>
+          <p:spPr>
+            <a:xfrm flipH="1">
+              <a:off x="590114" y="1201199"/>
+              <a:ext cx="499971" cy="499225"/>
+            </a:xfrm>
+            <a:prstGeom prst="line">
+              <a:avLst/>
+            </a:prstGeom>
+          </p:spPr>
+          <p:style>
+            <a:lnRef idx="2">
+              <a:schemeClr val="accent1"/>
+            </a:lnRef>
+            <a:fillRef idx="0">
+              <a:schemeClr val="accent1"/>
+            </a:fillRef>
+            <a:effectRef idx="1">
+              <a:schemeClr val="accent1"/>
+            </a:effectRef>
+            <a:fontRef idx="minor">
+              <a:schemeClr val="tx1"/>
+            </a:fontRef>
+          </p:style>
+        </p:cxnSp>
+        <p:cxnSp>
+          <p:nvCxnSpPr>
+            <p:cNvPr id="44" name="Straight Connector 43"/>
+            <p:cNvCxnSpPr>
+              <a:stCxn id="12" idx="2"/>
+            </p:cNvCxnSpPr>
+            <p:nvPr/>
+          </p:nvCxnSpPr>
+          <p:spPr>
+            <a:xfrm flipH="1">
+              <a:off x="590114" y="1630735"/>
+              <a:ext cx="1508247" cy="31044"/>
+            </a:xfrm>
+            <a:prstGeom prst="line">
+              <a:avLst/>
+            </a:prstGeom>
+          </p:spPr>
+          <p:style>
+            <a:lnRef idx="2">
+              <a:schemeClr val="accent1"/>
+            </a:lnRef>
+            <a:fillRef idx="0">
+              <a:schemeClr val="accent1"/>
+            </a:fillRef>
+            <a:effectRef idx="1">
+              <a:schemeClr val="accent1"/>
+            </a:effectRef>
+            <a:fontRef idx="minor">
+              <a:schemeClr val="tx1"/>
+            </a:fontRef>
+          </p:style>
+        </p:cxnSp>
+        <p:cxnSp>
+          <p:nvCxnSpPr>
+            <p:cNvPr id="45" name="Straight Connector 44"/>
+            <p:cNvCxnSpPr>
+              <a:stCxn id="7" idx="2"/>
+            </p:cNvCxnSpPr>
+            <p:nvPr/>
+          </p:nvCxnSpPr>
+          <p:spPr>
+            <a:xfrm flipH="1" flipV="1">
+              <a:off x="1083309" y="2037465"/>
+              <a:ext cx="970330" cy="31044"/>
+            </a:xfrm>
+            <a:prstGeom prst="line">
+              <a:avLst/>
+            </a:prstGeom>
+          </p:spPr>
+          <p:style>
+            <a:lnRef idx="2">
+              <a:schemeClr val="accent1"/>
+            </a:lnRef>
+            <a:fillRef idx="0">
+              <a:schemeClr val="accent1"/>
+            </a:fillRef>
+            <a:effectRef idx="1">
+              <a:schemeClr val="accent1"/>
+            </a:effectRef>
+            <a:fontRef idx="minor">
+              <a:schemeClr val="tx1"/>
+            </a:fontRef>
+          </p:style>
+        </p:cxnSp>
+        <p:cxnSp>
+          <p:nvCxnSpPr>
+            <p:cNvPr id="46" name="Straight Connector 45"/>
+            <p:cNvCxnSpPr/>
+            <p:nvPr/>
+          </p:nvCxnSpPr>
+          <p:spPr>
+            <a:xfrm flipH="1" flipV="1">
+              <a:off x="590114" y="1700423"/>
+              <a:ext cx="499971" cy="337041"/>
+            </a:xfrm>
+            <a:prstGeom prst="line">
+              <a:avLst/>
+            </a:prstGeom>
+          </p:spPr>
+          <p:style>
+            <a:lnRef idx="2">
+              <a:schemeClr val="accent1"/>
+            </a:lnRef>
+            <a:fillRef idx="0">
+              <a:schemeClr val="accent1"/>
+            </a:fillRef>
+            <a:effectRef idx="1">
+              <a:schemeClr val="accent1"/>
+            </a:effectRef>
+            <a:fontRef idx="minor">
+              <a:schemeClr val="tx1"/>
+            </a:fontRef>
+          </p:style>
+        </p:cxnSp>
+        <p:cxnSp>
+          <p:nvCxnSpPr>
+            <p:cNvPr id="47" name="Straight Connector 46"/>
+            <p:cNvCxnSpPr>
+              <a:endCxn id="9" idx="2"/>
+            </p:cNvCxnSpPr>
+            <p:nvPr/>
+          </p:nvCxnSpPr>
+          <p:spPr>
+            <a:xfrm>
+              <a:off x="590114" y="714816"/>
+              <a:ext cx="527075" cy="186893"/>
+            </a:xfrm>
+            <a:prstGeom prst="line">
+              <a:avLst/>
+            </a:prstGeom>
+          </p:spPr>
+          <p:style>
+            <a:lnRef idx="2">
+              <a:schemeClr val="accent1"/>
+            </a:lnRef>
+            <a:fillRef idx="0">
+              <a:schemeClr val="accent1"/>
+            </a:fillRef>
+            <a:effectRef idx="1">
+              <a:schemeClr val="accent1"/>
+            </a:effectRef>
+            <a:fontRef idx="minor">
+              <a:schemeClr val="tx1"/>
+            </a:fontRef>
+          </p:style>
+        </p:cxnSp>
+        <p:cxnSp>
+          <p:nvCxnSpPr>
+            <p:cNvPr id="48" name="Straight Connector 47"/>
+            <p:cNvCxnSpPr/>
+            <p:nvPr/>
+          </p:nvCxnSpPr>
+          <p:spPr>
+            <a:xfrm flipH="1">
+              <a:off x="590114" y="641154"/>
+              <a:ext cx="1508248" cy="54655"/>
+            </a:xfrm>
+            <a:prstGeom prst="line">
+              <a:avLst/>
+            </a:prstGeom>
+          </p:spPr>
+          <p:style>
+            <a:lnRef idx="2">
+              <a:schemeClr val="accent1"/>
+            </a:lnRef>
+            <a:fillRef idx="0">
+              <a:schemeClr val="accent1"/>
+            </a:fillRef>
+            <a:effectRef idx="1">
+              <a:schemeClr val="accent1"/>
+            </a:effectRef>
+            <a:fontRef idx="minor">
+              <a:schemeClr val="tx1"/>
+            </a:fontRef>
+          </p:style>
+        </p:cxnSp>
+        <p:cxnSp>
+          <p:nvCxnSpPr>
+            <p:cNvPr id="49" name="Straight Connector 48"/>
+            <p:cNvCxnSpPr>
+              <a:stCxn id="13" idx="2"/>
+            </p:cNvCxnSpPr>
+            <p:nvPr/>
+          </p:nvCxnSpPr>
+          <p:spPr>
+            <a:xfrm flipH="1" flipV="1">
+              <a:off x="744508" y="2440396"/>
+              <a:ext cx="1307776" cy="158698"/>
+            </a:xfrm>
+            <a:prstGeom prst="line">
+              <a:avLst/>
+            </a:prstGeom>
+          </p:spPr>
+          <p:style>
+            <a:lnRef idx="2">
+              <a:schemeClr val="accent1"/>
+            </a:lnRef>
+            <a:fillRef idx="0">
+              <a:schemeClr val="accent1"/>
+            </a:fillRef>
+            <a:effectRef idx="1">
+              <a:schemeClr val="accent1"/>
+            </a:effectRef>
+            <a:fontRef idx="minor">
+              <a:schemeClr val="tx1"/>
+            </a:fontRef>
+          </p:style>
+        </p:cxnSp>
+        <p:cxnSp>
+          <p:nvCxnSpPr>
+            <p:cNvPr id="50" name="Straight Connector 49"/>
+            <p:cNvCxnSpPr/>
+            <p:nvPr/>
+          </p:nvCxnSpPr>
+          <p:spPr>
+            <a:xfrm flipH="1" flipV="1">
+              <a:off x="590115" y="1700424"/>
+              <a:ext cx="154393" cy="739969"/>
+            </a:xfrm>
+            <a:prstGeom prst="line">
+              <a:avLst/>
+            </a:prstGeom>
+          </p:spPr>
+          <p:style>
+            <a:lnRef idx="2">
+              <a:schemeClr val="accent1"/>
+            </a:lnRef>
+            <a:fillRef idx="0">
+              <a:schemeClr val="accent1"/>
+            </a:fillRef>
+            <a:effectRef idx="1">
+              <a:schemeClr val="accent1"/>
+            </a:effectRef>
+            <a:fontRef idx="minor">
+              <a:schemeClr val="tx1"/>
+            </a:fontRef>
+          </p:style>
+        </p:cxnSp>
+        <p:cxnSp>
+          <p:nvCxnSpPr>
+            <p:cNvPr id="51" name="Straight Connector 50"/>
+            <p:cNvCxnSpPr>
+              <a:stCxn id="14" idx="2"/>
+            </p:cNvCxnSpPr>
+            <p:nvPr/>
+          </p:nvCxnSpPr>
+          <p:spPr>
+            <a:xfrm flipH="1" flipV="1">
+              <a:off x="656419" y="2505646"/>
+              <a:ext cx="462126" cy="373786"/>
+            </a:xfrm>
+            <a:prstGeom prst="line">
+              <a:avLst/>
+            </a:prstGeom>
+          </p:spPr>
+          <p:style>
+            <a:lnRef idx="2">
+              <a:schemeClr val="accent1"/>
+            </a:lnRef>
+            <a:fillRef idx="0">
+              <a:schemeClr val="accent1"/>
+            </a:fillRef>
+            <a:effectRef idx="1">
+              <a:schemeClr val="accent1"/>
+            </a:effectRef>
+            <a:fontRef idx="minor">
+              <a:schemeClr val="tx1"/>
+            </a:fontRef>
+          </p:style>
+        </p:cxnSp>
+        <p:cxnSp>
+          <p:nvCxnSpPr>
+            <p:cNvPr id="52" name="Straight Connector 51"/>
+            <p:cNvCxnSpPr/>
+            <p:nvPr/>
+          </p:nvCxnSpPr>
+          <p:spPr>
+            <a:xfrm flipH="1" flipV="1">
+              <a:off x="590114" y="1700423"/>
+              <a:ext cx="66304" cy="805223"/>
+            </a:xfrm>
+            <a:prstGeom prst="line">
+              <a:avLst/>
+            </a:prstGeom>
+          </p:spPr>
+          <p:style>
+            <a:lnRef idx="2">
+              <a:schemeClr val="accent1"/>
+            </a:lnRef>
+            <a:fillRef idx="0">
+              <a:schemeClr val="accent1"/>
+            </a:fillRef>
+            <a:effectRef idx="1">
+              <a:schemeClr val="accent1"/>
+            </a:effectRef>
+            <a:fontRef idx="minor">
+              <a:schemeClr val="tx1"/>
+            </a:fontRef>
+          </p:style>
+        </p:cxnSp>
+        <p:cxnSp>
+          <p:nvCxnSpPr>
+            <p:cNvPr id="53" name="Straight Connector 52"/>
+            <p:cNvCxnSpPr>
+              <a:stCxn id="15" idx="2"/>
+            </p:cNvCxnSpPr>
+            <p:nvPr/>
+          </p:nvCxnSpPr>
+          <p:spPr>
+            <a:xfrm flipH="1" flipV="1">
+              <a:off x="590115" y="2942786"/>
+              <a:ext cx="1508247" cy="172321"/>
+            </a:xfrm>
+            <a:prstGeom prst="line">
+              <a:avLst/>
+            </a:prstGeom>
+          </p:spPr>
+          <p:style>
+            <a:lnRef idx="2">
+              <a:schemeClr val="accent1"/>
+            </a:lnRef>
+            <a:fillRef idx="0">
+              <a:schemeClr val="accent1"/>
+            </a:fillRef>
+            <a:effectRef idx="1">
+              <a:schemeClr val="accent1"/>
+            </a:effectRef>
+            <a:fontRef idx="minor">
+              <a:schemeClr val="tx1"/>
+            </a:fontRef>
+          </p:style>
+        </p:cxnSp>
+        <p:cxnSp>
+          <p:nvCxnSpPr>
+            <p:cNvPr id="54" name="Straight Connector 53"/>
+            <p:cNvCxnSpPr/>
+            <p:nvPr/>
+          </p:nvCxnSpPr>
+          <p:spPr>
+            <a:xfrm flipV="1">
+              <a:off x="590114" y="1700423"/>
+              <a:ext cx="0" cy="1242363"/>
+            </a:xfrm>
+            <a:prstGeom prst="line">
+              <a:avLst/>
+            </a:prstGeom>
+          </p:spPr>
+          <p:style>
+            <a:lnRef idx="2">
+              <a:schemeClr val="accent1"/>
+            </a:lnRef>
+            <a:fillRef idx="0">
+              <a:schemeClr val="accent1"/>
+            </a:fillRef>
+            <a:effectRef idx="1">
+              <a:schemeClr val="accent1"/>
+            </a:effectRef>
+            <a:fontRef idx="minor">
+              <a:schemeClr val="tx1"/>
+            </a:fontRef>
+          </p:style>
+        </p:cxnSp>
+        <p:sp>
+          <p:nvSpPr>
+            <p:cNvPr id="55" name="Oval 54"/>
+            <p:cNvSpPr/>
+            <p:nvPr/>
+          </p:nvSpPr>
+          <p:spPr>
+            <a:xfrm>
+              <a:off x="3089020" y="322023"/>
+              <a:ext cx="935095" cy="373786"/>
+            </a:xfrm>
+            <a:prstGeom prst="ellipse">
+              <a:avLst/>
+            </a:prstGeom>
+          </p:spPr>
+          <p:style>
+            <a:lnRef idx="1">
+              <a:schemeClr val="accent1"/>
+            </a:lnRef>
+            <a:fillRef idx="3">
+              <a:schemeClr val="accent1"/>
+            </a:fillRef>
+            <a:effectRef idx="2">
+              <a:schemeClr val="accent1"/>
+            </a:effectRef>
+            <a:fontRef idx="minor">
+              <a:schemeClr val="lt1"/>
+            </a:fontRef>
+          </p:style>
+          <p:txBody>
+            <a:bodyPr rtlCol="0" anchor="ctr"/>
+            <a:lstStyle/>
+            <a:p>
+              <a:pPr algn="ctr"/>
+              <a:r>
+                <a:rPr lang="en-US" sz="800" dirty="0" smtClean="0"/>
+                <a:t>Subscribe to Alerts</a:t>
+              </a:r>
+              <a:endParaRPr lang="en-US" sz="800" dirty="0"/>
+            </a:p>
+          </p:txBody>
+        </p:sp>
+        <p:sp>
+          <p:nvSpPr>
+            <p:cNvPr id="56" name="Oval 55"/>
+            <p:cNvSpPr/>
+            <p:nvPr/>
+          </p:nvSpPr>
+          <p:spPr>
+            <a:xfrm>
+              <a:off x="2987379" y="730982"/>
+              <a:ext cx="935095" cy="373786"/>
+            </a:xfrm>
+            <a:prstGeom prst="ellipse">
+              <a:avLst/>
+            </a:prstGeom>
+          </p:spPr>
+          <p:style>
+            <a:lnRef idx="1">
+              <a:schemeClr val="accent1"/>
+            </a:lnRef>
+            <a:fillRef idx="3">
+              <a:schemeClr val="accent1"/>
+            </a:fillRef>
+            <a:effectRef idx="2">
+              <a:schemeClr val="accent1"/>
+            </a:effectRef>
+            <a:fontRef idx="minor">
+              <a:schemeClr val="lt1"/>
+            </a:fontRef>
+          </p:style>
+          <p:txBody>
+            <a:bodyPr rtlCol="0" anchor="ctr"/>
+            <a:lstStyle/>
+            <a:p>
+              <a:pPr algn="ctr"/>
+              <a:r>
+                <a:rPr lang="en-US" sz="800" dirty="0" smtClean="0"/>
+                <a:t>Uns</a:t>
+              </a:r>
+              <a:r>
+                <a:rPr lang="en-US" sz="800" dirty="0" smtClean="0"/>
+                <a:t>ubscribe to Alerts</a:t>
+              </a:r>
+              <a:endParaRPr lang="en-US" sz="800" dirty="0"/>
+            </a:p>
+          </p:txBody>
+        </p:sp>
+        <p:sp>
+          <p:nvSpPr>
+            <p:cNvPr id="57" name="Oval 56"/>
+            <p:cNvSpPr/>
+            <p:nvPr/>
+          </p:nvSpPr>
+          <p:spPr>
+            <a:xfrm>
+              <a:off x="3033456" y="1256949"/>
+              <a:ext cx="935095" cy="373786"/>
+            </a:xfrm>
+            <a:prstGeom prst="ellipse">
+              <a:avLst/>
+            </a:prstGeom>
+          </p:spPr>
+          <p:style>
+            <a:lnRef idx="1">
+              <a:schemeClr val="accent1"/>
+            </a:lnRef>
+            <a:fillRef idx="3">
+              <a:schemeClr val="accent1"/>
+            </a:fillRef>
+            <a:effectRef idx="2">
+              <a:schemeClr val="accent1"/>
+            </a:effectRef>
+            <a:fontRef idx="minor">
+              <a:schemeClr val="lt1"/>
+            </a:fontRef>
+          </p:style>
+          <p:txBody>
+            <a:bodyPr rtlCol="0" anchor="ctr"/>
+            <a:lstStyle/>
+            <a:p>
+              <a:pPr algn="ctr"/>
+              <a:r>
+                <a:rPr lang="en-US" sz="800" dirty="0" smtClean="0"/>
+                <a:t>View all Paths</a:t>
+              </a:r>
+              <a:endParaRPr lang="en-US" sz="800" dirty="0"/>
+            </a:p>
+          </p:txBody>
+        </p:sp>
+        <p:sp>
+          <p:nvSpPr>
+            <p:cNvPr id="58" name="Oval 57"/>
+            <p:cNvSpPr/>
+            <p:nvPr/>
+          </p:nvSpPr>
+          <p:spPr>
+            <a:xfrm>
+              <a:off x="3033456" y="1771576"/>
+              <a:ext cx="935095" cy="373786"/>
+            </a:xfrm>
+            <a:prstGeom prst="ellipse">
+              <a:avLst/>
+            </a:prstGeom>
+          </p:spPr>
+          <p:style>
+            <a:lnRef idx="1">
+              <a:schemeClr val="accent1"/>
+            </a:lnRef>
+            <a:fillRef idx="3">
+              <a:schemeClr val="accent1"/>
+            </a:fillRef>
+            <a:effectRef idx="2">
+              <a:schemeClr val="accent1"/>
+            </a:effectRef>
+            <a:fontRef idx="minor">
+              <a:schemeClr val="lt1"/>
+            </a:fontRef>
+          </p:style>
+          <p:txBody>
+            <a:bodyPr rtlCol="0" anchor="ctr"/>
+            <a:lstStyle/>
+            <a:p>
+              <a:pPr algn="ctr"/>
+              <a:r>
+                <a:rPr lang="en-US" sz="800" dirty="0" smtClean="0"/>
+                <a:t>Edit Path</a:t>
+              </a:r>
+              <a:endParaRPr lang="en-US" sz="800" dirty="0"/>
+            </a:p>
+          </p:txBody>
+        </p:sp>
+        <p:sp>
+          <p:nvSpPr>
+            <p:cNvPr id="59" name="Oval 58"/>
+            <p:cNvSpPr/>
+            <p:nvPr/>
+          </p:nvSpPr>
+          <p:spPr>
+            <a:xfrm>
+              <a:off x="3074112" y="2253500"/>
+              <a:ext cx="935095" cy="373786"/>
+            </a:xfrm>
+            <a:prstGeom prst="ellipse">
+              <a:avLst/>
+            </a:prstGeom>
+          </p:spPr>
+          <p:style>
+            <a:lnRef idx="1">
+              <a:schemeClr val="accent1"/>
+            </a:lnRef>
+            <a:fillRef idx="3">
+              <a:schemeClr val="accent1"/>
+            </a:fillRef>
+            <a:effectRef idx="2">
+              <a:schemeClr val="accent1"/>
+            </a:effectRef>
+            <a:fontRef idx="minor">
+              <a:schemeClr val="lt1"/>
+            </a:fontRef>
+          </p:style>
+          <p:txBody>
+            <a:bodyPr rtlCol="0" anchor="ctr"/>
+            <a:lstStyle/>
+            <a:p>
+              <a:pPr algn="ctr"/>
+              <a:r>
+                <a:rPr lang="en-US" sz="800" dirty="0" smtClean="0"/>
+                <a:t>Remove Path</a:t>
+              </a:r>
+              <a:endParaRPr lang="en-US" sz="800" dirty="0"/>
+            </a:p>
+          </p:txBody>
+        </p:sp>
+        <p:sp>
+          <p:nvSpPr>
+            <p:cNvPr id="60" name="Oval 59"/>
+            <p:cNvSpPr/>
+            <p:nvPr/>
+          </p:nvSpPr>
+          <p:spPr>
+            <a:xfrm>
+              <a:off x="1117189" y="1663679"/>
+              <a:ext cx="935095" cy="373786"/>
+            </a:xfrm>
+            <a:prstGeom prst="ellipse">
+              <a:avLst/>
+            </a:prstGeom>
+          </p:spPr>
+          <p:style>
+            <a:lnRef idx="1">
+              <a:schemeClr val="accent1"/>
+            </a:lnRef>
+            <a:fillRef idx="3">
+              <a:schemeClr val="accent1"/>
+            </a:fillRef>
+            <a:effectRef idx="2">
+              <a:schemeClr val="accent1"/>
+            </a:effectRef>
+            <a:fontRef idx="minor">
+              <a:schemeClr val="lt1"/>
+            </a:fontRef>
+          </p:style>
+          <p:txBody>
+            <a:bodyPr rtlCol="0" anchor="ctr"/>
+            <a:lstStyle/>
+            <a:p>
+              <a:pPr algn="ctr"/>
+              <a:r>
+                <a:rPr lang="en-US" sz="800" dirty="0" smtClean="0"/>
+                <a:t>View Account </a:t>
+              </a:r>
+              <a:r>
+                <a:rPr lang="en-US" sz="800" dirty="0" smtClean="0"/>
+                <a:t>Settings</a:t>
+              </a:r>
+              <a:endParaRPr lang="en-US" sz="800" dirty="0"/>
+            </a:p>
+          </p:txBody>
+        </p:sp>
+        <p:cxnSp>
+          <p:nvCxnSpPr>
+            <p:cNvPr id="61" name="Straight Connector 60"/>
+            <p:cNvCxnSpPr/>
+            <p:nvPr/>
+          </p:nvCxnSpPr>
+          <p:spPr>
+            <a:xfrm flipH="1" flipV="1">
+              <a:off x="590115" y="1700424"/>
+              <a:ext cx="204931" cy="368085"/>
+            </a:xfrm>
+            <a:prstGeom prst="line">
+              <a:avLst/>
+            </a:prstGeom>
+          </p:spPr>
+          <p:style>
+            <a:lnRef idx="2">
+              <a:schemeClr val="accent1"/>
+            </a:lnRef>
+            <a:fillRef idx="0">
+              <a:schemeClr val="accent1"/>
+            </a:fillRef>
+            <a:effectRef idx="1">
+              <a:schemeClr val="accent1"/>
+            </a:effectRef>
+            <a:fontRef idx="minor">
+              <a:schemeClr val="tx1"/>
+            </a:fontRef>
+          </p:style>
+        </p:cxnSp>
+        <p:grpSp>
+          <p:nvGrpSpPr>
+            <p:cNvPr id="62" name="Group 61"/>
+            <p:cNvGrpSpPr/>
+            <p:nvPr/>
+          </p:nvGrpSpPr>
+          <p:grpSpPr>
+            <a:xfrm>
+              <a:off x="4510156" y="1311011"/>
+              <a:ext cx="250714" cy="487822"/>
+              <a:chOff x="962523" y="935789"/>
+              <a:chExt cx="494632" cy="1029369"/>
+            </a:xfrm>
+          </p:grpSpPr>
+          <p:sp>
+            <p:nvSpPr>
+              <p:cNvPr id="63" name="Oval 62"/>
+              <p:cNvSpPr/>
+              <p:nvPr/>
+            </p:nvSpPr>
+            <p:spPr>
+              <a:xfrm>
+                <a:off x="1069474" y="935789"/>
+                <a:ext cx="294105" cy="387685"/>
+              </a:xfrm>
+              <a:prstGeom prst="ellipse">
+                <a:avLst/>
+              </a:prstGeom>
+            </p:spPr>
+            <p:style>
+              <a:lnRef idx="1">
+                <a:schemeClr val="accent1"/>
+              </a:lnRef>
+              <a:fillRef idx="3">
+                <a:schemeClr val="accent1"/>
+              </a:fillRef>
+              <a:effectRef idx="2">
+                <a:schemeClr val="accent1"/>
+              </a:effectRef>
+              <a:fontRef idx="minor">
+                <a:schemeClr val="lt1"/>
+              </a:fontRef>
+            </p:style>
+            <p:txBody>
+              <a:bodyPr rtlCol="0" anchor="ctr"/>
+              <a:lstStyle/>
+              <a:p>
+                <a:pPr algn="ctr"/>
+                <a:endParaRPr lang="en-US"/>
+              </a:p>
+            </p:txBody>
+          </p:sp>
+          <p:cxnSp>
+            <p:nvCxnSpPr>
+              <p:cNvPr id="64" name="Straight Connector 63"/>
+              <p:cNvCxnSpPr>
+                <a:stCxn id="63" idx="4"/>
+              </p:cNvCxnSpPr>
+              <p:nvPr/>
+            </p:nvCxnSpPr>
+            <p:spPr>
+              <a:xfrm>
+                <a:off x="1216527" y="1323474"/>
+                <a:ext cx="0" cy="394368"/>
+              </a:xfrm>
+              <a:prstGeom prst="line">
+                <a:avLst/>
+              </a:prstGeom>
+            </p:spPr>
+            <p:style>
+              <a:lnRef idx="2">
+                <a:schemeClr val="accent1"/>
+              </a:lnRef>
+              <a:fillRef idx="0">
+                <a:schemeClr val="accent1"/>
+              </a:fillRef>
+              <a:effectRef idx="1">
+                <a:schemeClr val="accent1"/>
+              </a:effectRef>
+              <a:fontRef idx="minor">
+                <a:schemeClr val="tx1"/>
+              </a:fontRef>
+            </p:style>
+          </p:cxnSp>
+          <p:cxnSp>
+            <p:nvCxnSpPr>
+              <p:cNvPr id="65" name="Straight Connector 64"/>
+              <p:cNvCxnSpPr/>
+              <p:nvPr/>
+            </p:nvCxnSpPr>
+            <p:spPr>
+              <a:xfrm flipH="1">
+                <a:off x="1069474" y="1717842"/>
+                <a:ext cx="147053" cy="247316"/>
+              </a:xfrm>
+              <a:prstGeom prst="line">
+                <a:avLst/>
+              </a:prstGeom>
+            </p:spPr>
+            <p:style>
+              <a:lnRef idx="2">
+                <a:schemeClr val="accent1"/>
+              </a:lnRef>
+              <a:fillRef idx="0">
+                <a:schemeClr val="accent1"/>
+              </a:fillRef>
+              <a:effectRef idx="1">
+                <a:schemeClr val="accent1"/>
+              </a:effectRef>
+              <a:fontRef idx="minor">
+                <a:schemeClr val="tx1"/>
+              </a:fontRef>
+            </p:style>
+          </p:cxnSp>
+          <p:cxnSp>
+            <p:nvCxnSpPr>
+              <p:cNvPr id="66" name="Straight Connector 65"/>
+              <p:cNvCxnSpPr/>
+              <p:nvPr/>
+            </p:nvCxnSpPr>
+            <p:spPr>
+              <a:xfrm>
+                <a:off x="1216527" y="1717842"/>
+                <a:ext cx="147052" cy="247316"/>
+              </a:xfrm>
+              <a:prstGeom prst="line">
+                <a:avLst/>
+              </a:prstGeom>
+            </p:spPr>
+            <p:style>
+              <a:lnRef idx="2">
+                <a:schemeClr val="accent1"/>
+              </a:lnRef>
+              <a:fillRef idx="0">
+                <a:schemeClr val="accent1"/>
+              </a:fillRef>
+              <a:effectRef idx="1">
+                <a:schemeClr val="accent1"/>
+              </a:effectRef>
+              <a:fontRef idx="minor">
+                <a:schemeClr val="tx1"/>
+              </a:fontRef>
+            </p:style>
+          </p:cxnSp>
+          <p:cxnSp>
+            <p:nvCxnSpPr>
+              <p:cNvPr id="67" name="Straight Connector 66"/>
+              <p:cNvCxnSpPr/>
+              <p:nvPr/>
+            </p:nvCxnSpPr>
+            <p:spPr>
+              <a:xfrm>
+                <a:off x="962523" y="1477209"/>
+                <a:ext cx="494632" cy="0"/>
+              </a:xfrm>
+              <a:prstGeom prst="line">
+                <a:avLst/>
+              </a:prstGeom>
+            </p:spPr>
+            <p:style>
+              <a:lnRef idx="2">
+                <a:schemeClr val="accent1"/>
+              </a:lnRef>
+              <a:fillRef idx="0">
+                <a:schemeClr val="accent1"/>
+              </a:fillRef>
+              <a:effectRef idx="1">
+                <a:schemeClr val="accent1"/>
+              </a:effectRef>
+              <a:fontRef idx="minor">
+                <a:schemeClr val="tx1"/>
+              </a:fontRef>
+            </p:style>
+          </p:cxnSp>
+        </p:grpSp>
+        <p:sp>
+          <p:nvSpPr>
+            <p:cNvPr id="68" name="TextBox 67"/>
+            <p:cNvSpPr txBox="1"/>
+            <p:nvPr/>
+          </p:nvSpPr>
+          <p:spPr>
+            <a:xfrm>
+              <a:off x="4521971" y="1798766"/>
+              <a:ext cx="314606" cy="175028"/>
+            </a:xfrm>
+            <a:prstGeom prst="rect">
+              <a:avLst/>
+            </a:prstGeom>
+            <a:noFill/>
+          </p:spPr>
+          <p:txBody>
+            <a:bodyPr wrap="none" rtlCol="0">
+              <a:spAutoFit/>
+            </a:bodyPr>
+            <a:lstStyle/>
+            <a:p>
+              <a:r>
+                <a:rPr lang="en-US" dirty="0" smtClean="0">
+                  <a:solidFill>
+                    <a:schemeClr val="tx2">
+                      <a:lumMod val="60000"/>
+                      <a:lumOff val="40000"/>
+                    </a:schemeClr>
+                  </a:solidFill>
+                </a:rPr>
+                <a:t>User</a:t>
+              </a:r>
+              <a:endParaRPr lang="en-US" dirty="0">
+                <a:solidFill>
+                  <a:schemeClr val="tx2">
+                    <a:lumMod val="60000"/>
+                    <a:lumOff val="40000"/>
+                  </a:schemeClr>
+                </a:solidFill>
+              </a:endParaRPr>
+            </a:p>
+          </p:txBody>
+        </p:sp>
+        <p:cxnSp>
+          <p:nvCxnSpPr>
+            <p:cNvPr id="69" name="Straight Connector 68"/>
+            <p:cNvCxnSpPr>
+              <a:endCxn id="55" idx="6"/>
+            </p:cNvCxnSpPr>
+            <p:nvPr/>
+          </p:nvCxnSpPr>
+          <p:spPr>
+            <a:xfrm flipH="1" flipV="1">
+              <a:off x="4024115" y="508916"/>
+              <a:ext cx="429416" cy="1058675"/>
+            </a:xfrm>
+            <a:prstGeom prst="line">
+              <a:avLst/>
+            </a:prstGeom>
+          </p:spPr>
+          <p:style>
+            <a:lnRef idx="2">
+              <a:schemeClr val="accent1"/>
+            </a:lnRef>
+            <a:fillRef idx="0">
+              <a:schemeClr val="accent1"/>
+            </a:fillRef>
+            <a:effectRef idx="1">
+              <a:schemeClr val="accent1"/>
+            </a:effectRef>
+            <a:fontRef idx="minor">
+              <a:schemeClr val="tx1"/>
+            </a:fontRef>
+          </p:style>
+        </p:cxnSp>
+        <p:cxnSp>
+          <p:nvCxnSpPr>
+            <p:cNvPr id="70" name="Straight Connector 69"/>
+            <p:cNvCxnSpPr>
+              <a:endCxn id="56" idx="6"/>
+            </p:cNvCxnSpPr>
+            <p:nvPr/>
+          </p:nvCxnSpPr>
+          <p:spPr>
+            <a:xfrm flipH="1" flipV="1">
+              <a:off x="3922474" y="917875"/>
+              <a:ext cx="429416" cy="620059"/>
+            </a:xfrm>
+            <a:prstGeom prst="line">
+              <a:avLst/>
+            </a:prstGeom>
+          </p:spPr>
+          <p:style>
+            <a:lnRef idx="2">
+              <a:schemeClr val="accent1"/>
+            </a:lnRef>
+            <a:fillRef idx="0">
+              <a:schemeClr val="accent1"/>
+            </a:fillRef>
+            <a:effectRef idx="1">
+              <a:schemeClr val="accent1"/>
+            </a:effectRef>
+            <a:fontRef idx="minor">
+              <a:schemeClr val="tx1"/>
+            </a:fontRef>
+          </p:style>
+        </p:cxnSp>
+        <p:cxnSp>
+          <p:nvCxnSpPr>
+            <p:cNvPr id="71" name="Straight Connector 70"/>
+            <p:cNvCxnSpPr>
+              <a:endCxn id="57" idx="6"/>
+            </p:cNvCxnSpPr>
+            <p:nvPr/>
+          </p:nvCxnSpPr>
+          <p:spPr>
+            <a:xfrm flipH="1" flipV="1">
+              <a:off x="3968551" y="1443842"/>
+              <a:ext cx="484980" cy="131142"/>
+            </a:xfrm>
+            <a:prstGeom prst="line">
+              <a:avLst/>
+            </a:prstGeom>
+          </p:spPr>
+          <p:style>
+            <a:lnRef idx="2">
+              <a:schemeClr val="accent1"/>
+            </a:lnRef>
+            <a:fillRef idx="0">
+              <a:schemeClr val="accent1"/>
+            </a:fillRef>
+            <a:effectRef idx="1">
+              <a:schemeClr val="accent1"/>
+            </a:effectRef>
+            <a:fontRef idx="minor">
+              <a:schemeClr val="tx1"/>
+            </a:fontRef>
+          </p:style>
+        </p:cxnSp>
+        <p:cxnSp>
+          <p:nvCxnSpPr>
+            <p:cNvPr id="72" name="Straight Connector 71"/>
+            <p:cNvCxnSpPr>
+              <a:endCxn id="58" idx="6"/>
+            </p:cNvCxnSpPr>
+            <p:nvPr/>
+          </p:nvCxnSpPr>
+          <p:spPr>
+            <a:xfrm flipH="1">
+              <a:off x="3968551" y="1577254"/>
+              <a:ext cx="429416" cy="381215"/>
+            </a:xfrm>
+            <a:prstGeom prst="line">
+              <a:avLst/>
+            </a:prstGeom>
+          </p:spPr>
+          <p:style>
+            <a:lnRef idx="2">
+              <a:schemeClr val="accent1"/>
+            </a:lnRef>
+            <a:fillRef idx="0">
+              <a:schemeClr val="accent1"/>
+            </a:fillRef>
+            <a:effectRef idx="1">
+              <a:schemeClr val="accent1"/>
+            </a:effectRef>
+            <a:fontRef idx="minor">
+              <a:schemeClr val="tx1"/>
+            </a:fontRef>
+          </p:style>
+        </p:cxnSp>
+        <p:cxnSp>
+          <p:nvCxnSpPr>
+            <p:cNvPr id="73" name="Straight Connector 72"/>
+            <p:cNvCxnSpPr>
+              <a:endCxn id="59" idx="6"/>
+            </p:cNvCxnSpPr>
+            <p:nvPr/>
+          </p:nvCxnSpPr>
+          <p:spPr>
+            <a:xfrm flipH="1">
+              <a:off x="4009207" y="1567592"/>
+              <a:ext cx="444324" cy="872801"/>
+            </a:xfrm>
+            <a:prstGeom prst="line">
+              <a:avLst/>
+            </a:prstGeom>
+          </p:spPr>
+          <p:style>
+            <a:lnRef idx="2">
+              <a:schemeClr val="accent1"/>
+            </a:lnRef>
+            <a:fillRef idx="0">
+              <a:schemeClr val="accent1"/>
+            </a:fillRef>
+            <a:effectRef idx="1">
+              <a:schemeClr val="accent1"/>
+            </a:effectRef>
+            <a:fontRef idx="minor">
+              <a:schemeClr val="tx1"/>
+            </a:fontRef>
+          </p:style>
+        </p:cxnSp>
+        <p:sp>
+          <p:nvSpPr>
+            <p:cNvPr id="78" name="TextBox 77"/>
+            <p:cNvSpPr txBox="1"/>
+            <p:nvPr/>
+          </p:nvSpPr>
+          <p:spPr>
+            <a:xfrm>
+              <a:off x="4127500" y="2627286"/>
+              <a:ext cx="1566333" cy="577081"/>
+            </a:xfrm>
+            <a:prstGeom prst="rect">
+              <a:avLst/>
+            </a:prstGeom>
+            <a:noFill/>
+          </p:spPr>
+          <p:txBody>
+            <a:bodyPr wrap="square" rtlCol="0">
+              <a:spAutoFit/>
+            </a:bodyPr>
+            <a:lstStyle/>
+            <a:p>
+              <a:r>
+                <a:rPr lang="en-US" sz="1050" dirty="0" smtClean="0">
+                  <a:solidFill>
+                    <a:schemeClr val="tx2">
+                      <a:lumMod val="60000"/>
+                      <a:lumOff val="40000"/>
+                    </a:schemeClr>
+                  </a:solidFill>
+                </a:rPr>
+                <a:t>*Note: User is the same actor and duplicated to connect lines easier.</a:t>
+              </a:r>
+              <a:endParaRPr lang="en-US" sz="1050" dirty="0">
+                <a:solidFill>
+                  <a:schemeClr val="tx2">
+                    <a:lumMod val="60000"/>
+                    <a:lumOff val="40000"/>
+                  </a:schemeClr>
+                </a:solidFill>
+              </a:endParaRPr>
+            </a:p>
+          </p:txBody>
+        </p:sp>
+      </p:grpSp>
+    </p:spTree>
+    <p:extLst>
+      <p:ext uri="{BB962C8B-B14F-4D97-AF65-F5344CB8AC3E}">
+        <p14:creationId xmlns:p14="http://schemas.microsoft.com/office/powerpoint/2010/main" val="301228085"/>
       </p:ext>
     </p:extLst>
   </p:cSld>

</xml_diff>